<commit_message>
Update with 2000-2017 data
</commit_message>
<xml_diff>
--- a/Project 1 Presentationv4.pptx
+++ b/Project 1 Presentationv4.pptx
@@ -7,23 +7,26 @@
   <p:sldIdLst>
     <p:sldId id="257" r:id="rId2"/>
     <p:sldId id="256" r:id="rId3"/>
-    <p:sldId id="274" r:id="rId4"/>
-    <p:sldId id="275" r:id="rId5"/>
-    <p:sldId id="276" r:id="rId6"/>
-    <p:sldId id="258" r:id="rId7"/>
+    <p:sldId id="258" r:id="rId4"/>
+    <p:sldId id="274" r:id="rId5"/>
+    <p:sldId id="275" r:id="rId6"/>
+    <p:sldId id="276" r:id="rId7"/>
     <p:sldId id="259" r:id="rId8"/>
-    <p:sldId id="269" r:id="rId9"/>
-    <p:sldId id="270" r:id="rId10"/>
-    <p:sldId id="266" r:id="rId11"/>
-    <p:sldId id="261" r:id="rId12"/>
-    <p:sldId id="260" r:id="rId13"/>
-    <p:sldId id="262" r:id="rId14"/>
-    <p:sldId id="263" r:id="rId15"/>
-    <p:sldId id="264" r:id="rId16"/>
-    <p:sldId id="273" r:id="rId17"/>
-    <p:sldId id="265" r:id="rId18"/>
-    <p:sldId id="267" r:id="rId19"/>
-    <p:sldId id="268" r:id="rId20"/>
+    <p:sldId id="277" r:id="rId9"/>
+    <p:sldId id="269" r:id="rId10"/>
+    <p:sldId id="278" r:id="rId11"/>
+    <p:sldId id="270" r:id="rId12"/>
+    <p:sldId id="279" r:id="rId13"/>
+    <p:sldId id="266" r:id="rId14"/>
+    <p:sldId id="261" r:id="rId15"/>
+    <p:sldId id="260" r:id="rId16"/>
+    <p:sldId id="262" r:id="rId17"/>
+    <p:sldId id="263" r:id="rId18"/>
+    <p:sldId id="264" r:id="rId19"/>
+    <p:sldId id="273" r:id="rId20"/>
+    <p:sldId id="265" r:id="rId21"/>
+    <p:sldId id="267" r:id="rId22"/>
+    <p:sldId id="268" r:id="rId23"/>
   </p:sldIdLst>
   <p:sldSz cx="12192000" cy="6858000"/>
   <p:notesSz cx="6858000" cy="9144000"/>
@@ -3471,6 +3474,525 @@
 </file>
 
 <file path=ppt/slides/slide10.xml><?xml version="1.0" encoding="utf-8"?>
+<p:sld xmlns:a="http://schemas.openxmlformats.org/drawingml/2006/main" xmlns:r="http://schemas.openxmlformats.org/officeDocument/2006/relationships" xmlns:p="http://schemas.openxmlformats.org/presentationml/2006/main">
+  <p:cSld>
+    <p:spTree>
+      <p:nvGrpSpPr>
+        <p:cNvPr id="1" name=""/>
+        <p:cNvGrpSpPr/>
+        <p:nvPr/>
+      </p:nvGrpSpPr>
+      <p:grpSpPr>
+        <a:xfrm>
+          <a:off x="0" y="0"/>
+          <a:ext cx="0" cy="0"/>
+          <a:chOff x="0" y="0"/>
+          <a:chExt cx="0" cy="0"/>
+        </a:xfrm>
+      </p:grpSpPr>
+      <p:pic>
+        <p:nvPicPr>
+          <p:cNvPr id="4" name="Picture 3">
+            <a:extLst>
+              <a:ext uri="{FF2B5EF4-FFF2-40B4-BE49-F238E27FC236}">
+                <a16:creationId xmlns:a16="http://schemas.microsoft.com/office/drawing/2014/main" id="{019C92C5-FE94-4056-84F2-D7FC0B7427C4}"/>
+              </a:ext>
+            </a:extLst>
+          </p:cNvPr>
+          <p:cNvPicPr>
+            <a:picLocks noChangeAspect="1"/>
+          </p:cNvPicPr>
+          <p:nvPr/>
+        </p:nvPicPr>
+        <p:blipFill>
+          <a:blip r:embed="rId2"/>
+          <a:stretch>
+            <a:fillRect/>
+          </a:stretch>
+        </p:blipFill>
+        <p:spPr>
+          <a:xfrm>
+            <a:off x="1374675" y="1052712"/>
+            <a:ext cx="6949093" cy="5513254"/>
+          </a:xfrm>
+          <a:prstGeom prst="rect">
+            <a:avLst/>
+          </a:prstGeom>
+        </p:spPr>
+      </p:pic>
+      <p:pic>
+        <p:nvPicPr>
+          <p:cNvPr id="7" name="Picture 6">
+            <a:extLst>
+              <a:ext uri="{FF2B5EF4-FFF2-40B4-BE49-F238E27FC236}">
+                <a16:creationId xmlns:a16="http://schemas.microsoft.com/office/drawing/2014/main" id="{81E95F85-8614-4334-B985-1AEB60E197AC}"/>
+              </a:ext>
+            </a:extLst>
+          </p:cNvPr>
+          <p:cNvPicPr>
+            <a:picLocks noChangeAspect="1"/>
+          </p:cNvPicPr>
+          <p:nvPr/>
+        </p:nvPicPr>
+        <p:blipFill rotWithShape="1">
+          <a:blip r:embed="rId3">
+            <a:extLst>
+              <a:ext uri="{28A0092B-C50C-407E-A947-70E740481C1C}">
+                <a14:useLocalDpi xmlns:a14="http://schemas.microsoft.com/office/drawing/2010/main" val="0"/>
+              </a:ext>
+            </a:extLst>
+          </a:blip>
+          <a:srcRect l="74326" b="69573"/>
+          <a:stretch/>
+        </p:blipFill>
+        <p:spPr>
+          <a:xfrm>
+            <a:off x="8625426" y="2209474"/>
+            <a:ext cx="2534643" cy="1672660"/>
+          </a:xfrm>
+          <a:prstGeom prst="rect">
+            <a:avLst/>
+          </a:prstGeom>
+        </p:spPr>
+      </p:pic>
+      <p:sp>
+        <p:nvSpPr>
+          <p:cNvPr id="8" name="TextBox 7">
+            <a:extLst>
+              <a:ext uri="{FF2B5EF4-FFF2-40B4-BE49-F238E27FC236}">
+                <a16:creationId xmlns:a16="http://schemas.microsoft.com/office/drawing/2014/main" id="{E5DF6A43-E5E1-4751-9EDB-7C861F97C777}"/>
+              </a:ext>
+            </a:extLst>
+          </p:cNvPr>
+          <p:cNvSpPr txBox="1"/>
+          <p:nvPr/>
+        </p:nvSpPr>
+        <p:spPr>
+          <a:xfrm>
+            <a:off x="464235" y="406381"/>
+            <a:ext cx="11254154" cy="646331"/>
+          </a:xfrm>
+          <a:prstGeom prst="rect">
+            <a:avLst/>
+          </a:prstGeom>
+          <a:noFill/>
+        </p:spPr>
+        <p:txBody>
+          <a:bodyPr wrap="square" rtlCol="0">
+            <a:spAutoFit/>
+          </a:bodyPr>
+          <a:lstStyle/>
+          <a:p>
+            <a:pPr algn="ctr"/>
+            <a:r>
+              <a:rPr lang="en-US" sz="3600" b="1" dirty="0"/>
+              <a:t>RESULTS:  TRENDS BY RACE (Comparison)</a:t>
+            </a:r>
+          </a:p>
+        </p:txBody>
+      </p:sp>
+    </p:spTree>
+    <p:extLst>
+      <p:ext uri="{BB962C8B-B14F-4D97-AF65-F5344CB8AC3E}">
+        <p14:creationId xmlns:p14="http://schemas.microsoft.com/office/powerpoint/2010/main" val="1109006666"/>
+      </p:ext>
+    </p:extLst>
+  </p:cSld>
+  <p:clrMapOvr>
+    <a:masterClrMapping/>
+  </p:clrMapOvr>
+</p:sld>
+</file>
+
+<file path=ppt/slides/slide11.xml><?xml version="1.0" encoding="utf-8"?>
+<p:sld xmlns:a="http://schemas.openxmlformats.org/drawingml/2006/main" xmlns:r="http://schemas.openxmlformats.org/officeDocument/2006/relationships" xmlns:p="http://schemas.openxmlformats.org/presentationml/2006/main">
+  <p:cSld>
+    <p:spTree>
+      <p:nvGrpSpPr>
+        <p:cNvPr id="1" name=""/>
+        <p:cNvGrpSpPr/>
+        <p:nvPr/>
+      </p:nvGrpSpPr>
+      <p:grpSpPr>
+        <a:xfrm>
+          <a:off x="0" y="0"/>
+          <a:ext cx="0" cy="0"/>
+          <a:chOff x="0" y="0"/>
+          <a:chExt cx="0" cy="0"/>
+        </a:xfrm>
+      </p:grpSpPr>
+      <p:sp>
+        <p:nvSpPr>
+          <p:cNvPr id="5" name="TextBox 4">
+            <a:extLst>
+              <a:ext uri="{FF2B5EF4-FFF2-40B4-BE49-F238E27FC236}">
+                <a16:creationId xmlns:a16="http://schemas.microsoft.com/office/drawing/2014/main" id="{ACF4CA0C-77E4-4A5A-8A69-9987311CA65B}"/>
+              </a:ext>
+            </a:extLst>
+          </p:cNvPr>
+          <p:cNvSpPr txBox="1"/>
+          <p:nvPr/>
+        </p:nvSpPr>
+        <p:spPr>
+          <a:xfrm>
+            <a:off x="2299252" y="1791205"/>
+            <a:ext cx="7898295" cy="646331"/>
+          </a:xfrm>
+          <a:prstGeom prst="rect">
+            <a:avLst/>
+          </a:prstGeom>
+          <a:noFill/>
+        </p:spPr>
+        <p:txBody>
+          <a:bodyPr wrap="square" rtlCol="0">
+            <a:spAutoFit/>
+          </a:bodyPr>
+          <a:lstStyle/>
+          <a:p>
+            <a:pPr marL="285750" indent="-285750">
+              <a:buFont typeface="Arial" panose="020B0604020202020204" pitchFamily="34" charset="0"/>
+              <a:buChar char="•"/>
+            </a:pPr>
+            <a:endParaRPr lang="en-US" dirty="0"/>
+          </a:p>
+          <a:p>
+            <a:pPr marL="285750" indent="-285750">
+              <a:buFont typeface="Arial" panose="020B0604020202020204" pitchFamily="34" charset="0"/>
+              <a:buChar char="•"/>
+            </a:pPr>
+            <a:endParaRPr lang="en-US" dirty="0"/>
+          </a:p>
+        </p:txBody>
+      </p:sp>
+      <p:sp>
+        <p:nvSpPr>
+          <p:cNvPr id="6" name="Rectangle 5">
+            <a:extLst>
+              <a:ext uri="{FF2B5EF4-FFF2-40B4-BE49-F238E27FC236}">
+                <a16:creationId xmlns:a16="http://schemas.microsoft.com/office/drawing/2014/main" id="{92CC0FFC-9FF3-48BF-905A-87822B7B6042}"/>
+              </a:ext>
+            </a:extLst>
+          </p:cNvPr>
+          <p:cNvSpPr/>
+          <p:nvPr/>
+        </p:nvSpPr>
+        <p:spPr>
+          <a:xfrm>
+            <a:off x="464236" y="998269"/>
+            <a:ext cx="11283816" cy="830997"/>
+          </a:xfrm>
+          <a:prstGeom prst="rect">
+            <a:avLst/>
+          </a:prstGeom>
+        </p:spPr>
+        <p:txBody>
+          <a:bodyPr wrap="square">
+            <a:spAutoFit/>
+          </a:bodyPr>
+          <a:lstStyle/>
+          <a:p>
+            <a:pPr lvl="0" algn="ctr"/>
+            <a:r>
+              <a:rPr lang="en-US" sz="2400" dirty="0"/>
+              <a:t>What are the trends from 2013-2017 for the overall entertainment category in total consumer expenditure?</a:t>
+            </a:r>
+          </a:p>
+        </p:txBody>
+      </p:sp>
+      <p:pic>
+        <p:nvPicPr>
+          <p:cNvPr id="3" name="Picture 2">
+            <a:extLst>
+              <a:ext uri="{FF2B5EF4-FFF2-40B4-BE49-F238E27FC236}">
+                <a16:creationId xmlns:a16="http://schemas.microsoft.com/office/drawing/2014/main" id="{4167058B-748C-4C97-974C-5ED76C793A9A}"/>
+              </a:ext>
+            </a:extLst>
+          </p:cNvPr>
+          <p:cNvPicPr>
+            <a:picLocks noChangeAspect="1"/>
+          </p:cNvPicPr>
+          <p:nvPr/>
+        </p:nvPicPr>
+        <p:blipFill rotWithShape="1">
+          <a:blip r:embed="rId2">
+            <a:extLst>
+              <a:ext uri="{28A0092B-C50C-407E-A947-70E740481C1C}">
+                <a14:useLocalDpi xmlns:a14="http://schemas.microsoft.com/office/drawing/2010/main" val="0"/>
+              </a:ext>
+            </a:extLst>
+          </a:blip>
+          <a:srcRect r="14647"/>
+          <a:stretch/>
+        </p:blipFill>
+        <p:spPr>
+          <a:xfrm>
+            <a:off x="2420809" y="2157562"/>
+            <a:ext cx="5898237" cy="4348500"/>
+          </a:xfrm>
+          <a:prstGeom prst="rect">
+            <a:avLst/>
+          </a:prstGeom>
+        </p:spPr>
+      </p:pic>
+      <p:pic>
+        <p:nvPicPr>
+          <p:cNvPr id="7" name="Picture 6">
+            <a:extLst>
+              <a:ext uri="{FF2B5EF4-FFF2-40B4-BE49-F238E27FC236}">
+                <a16:creationId xmlns:a16="http://schemas.microsoft.com/office/drawing/2014/main" id="{49F55AE3-64CE-4938-9DA8-7BAB0B7A7D81}"/>
+              </a:ext>
+            </a:extLst>
+          </p:cNvPr>
+          <p:cNvPicPr>
+            <a:picLocks noChangeAspect="1"/>
+          </p:cNvPicPr>
+          <p:nvPr/>
+        </p:nvPicPr>
+        <p:blipFill rotWithShape="1">
+          <a:blip r:embed="rId2">
+            <a:extLst>
+              <a:ext uri="{28A0092B-C50C-407E-A947-70E740481C1C}">
+                <a14:useLocalDpi xmlns:a14="http://schemas.microsoft.com/office/drawing/2010/main" val="0"/>
+              </a:ext>
+            </a:extLst>
+          </a:blip>
+          <a:srcRect l="82741" b="67692"/>
+          <a:stretch/>
+        </p:blipFill>
+        <p:spPr>
+          <a:xfrm>
+            <a:off x="9155078" y="2132263"/>
+            <a:ext cx="1669014" cy="1965945"/>
+          </a:xfrm>
+          <a:prstGeom prst="rect">
+            <a:avLst/>
+          </a:prstGeom>
+        </p:spPr>
+      </p:pic>
+      <p:sp>
+        <p:nvSpPr>
+          <p:cNvPr id="8" name="TextBox 7">
+            <a:extLst>
+              <a:ext uri="{FF2B5EF4-FFF2-40B4-BE49-F238E27FC236}">
+                <a16:creationId xmlns:a16="http://schemas.microsoft.com/office/drawing/2014/main" id="{F07CDC73-BABD-4E5C-B927-4C193DCDB27E}"/>
+              </a:ext>
+            </a:extLst>
+          </p:cNvPr>
+          <p:cNvSpPr txBox="1"/>
+          <p:nvPr/>
+        </p:nvSpPr>
+        <p:spPr>
+          <a:xfrm>
+            <a:off x="464235" y="406381"/>
+            <a:ext cx="11254154" cy="646331"/>
+          </a:xfrm>
+          <a:prstGeom prst="rect">
+            <a:avLst/>
+          </a:prstGeom>
+          <a:noFill/>
+        </p:spPr>
+        <p:txBody>
+          <a:bodyPr wrap="square" rtlCol="0">
+            <a:spAutoFit/>
+          </a:bodyPr>
+          <a:lstStyle/>
+          <a:p>
+            <a:pPr algn="ctr"/>
+            <a:r>
+              <a:rPr lang="en-US" sz="3600" b="1" dirty="0"/>
+              <a:t>RESULTS:  TRENDS BY REGION</a:t>
+            </a:r>
+          </a:p>
+        </p:txBody>
+      </p:sp>
+    </p:spTree>
+    <p:extLst>
+      <p:ext uri="{BB962C8B-B14F-4D97-AF65-F5344CB8AC3E}">
+        <p14:creationId xmlns:p14="http://schemas.microsoft.com/office/powerpoint/2010/main" val="3516245655"/>
+      </p:ext>
+    </p:extLst>
+  </p:cSld>
+  <p:clrMapOvr>
+    <a:masterClrMapping/>
+  </p:clrMapOvr>
+</p:sld>
+</file>
+
+<file path=ppt/slides/slide12.xml><?xml version="1.0" encoding="utf-8"?>
+<p:sld xmlns:a="http://schemas.openxmlformats.org/drawingml/2006/main" xmlns:r="http://schemas.openxmlformats.org/officeDocument/2006/relationships" xmlns:p="http://schemas.openxmlformats.org/presentationml/2006/main">
+  <p:cSld>
+    <p:spTree>
+      <p:nvGrpSpPr>
+        <p:cNvPr id="1" name=""/>
+        <p:cNvGrpSpPr/>
+        <p:nvPr/>
+      </p:nvGrpSpPr>
+      <p:grpSpPr>
+        <a:xfrm>
+          <a:off x="0" y="0"/>
+          <a:ext cx="0" cy="0"/>
+          <a:chOff x="0" y="0"/>
+          <a:chExt cx="0" cy="0"/>
+        </a:xfrm>
+      </p:grpSpPr>
+      <p:pic>
+        <p:nvPicPr>
+          <p:cNvPr id="4" name="Picture 3">
+            <a:extLst>
+              <a:ext uri="{FF2B5EF4-FFF2-40B4-BE49-F238E27FC236}">
+                <a16:creationId xmlns:a16="http://schemas.microsoft.com/office/drawing/2014/main" id="{740C6519-403B-4C64-872F-89EB07843C19}"/>
+              </a:ext>
+            </a:extLst>
+          </p:cNvPr>
+          <p:cNvPicPr>
+            <a:picLocks noChangeAspect="1"/>
+          </p:cNvPicPr>
+          <p:nvPr/>
+        </p:nvPicPr>
+        <p:blipFill>
+          <a:blip r:embed="rId2"/>
+          <a:stretch>
+            <a:fillRect/>
+          </a:stretch>
+        </p:blipFill>
+        <p:spPr>
+          <a:xfrm>
+            <a:off x="1467832" y="1174287"/>
+            <a:ext cx="6695780" cy="5277332"/>
+          </a:xfrm>
+          <a:prstGeom prst="rect">
+            <a:avLst/>
+          </a:prstGeom>
+        </p:spPr>
+      </p:pic>
+      <p:sp>
+        <p:nvSpPr>
+          <p:cNvPr id="5" name="TextBox 4">
+            <a:extLst>
+              <a:ext uri="{FF2B5EF4-FFF2-40B4-BE49-F238E27FC236}">
+                <a16:creationId xmlns:a16="http://schemas.microsoft.com/office/drawing/2014/main" id="{ACF4CA0C-77E4-4A5A-8A69-9987311CA65B}"/>
+              </a:ext>
+            </a:extLst>
+          </p:cNvPr>
+          <p:cNvSpPr txBox="1"/>
+          <p:nvPr/>
+        </p:nvSpPr>
+        <p:spPr>
+          <a:xfrm>
+            <a:off x="2308679" y="1809097"/>
+            <a:ext cx="7898295" cy="646331"/>
+          </a:xfrm>
+          <a:prstGeom prst="rect">
+            <a:avLst/>
+          </a:prstGeom>
+          <a:noFill/>
+        </p:spPr>
+        <p:txBody>
+          <a:bodyPr wrap="square" rtlCol="0">
+            <a:spAutoFit/>
+          </a:bodyPr>
+          <a:lstStyle/>
+          <a:p>
+            <a:pPr marL="285750" indent="-285750">
+              <a:buFont typeface="Arial" panose="020B0604020202020204" pitchFamily="34" charset="0"/>
+              <a:buChar char="•"/>
+            </a:pPr>
+            <a:endParaRPr lang="en-US" dirty="0"/>
+          </a:p>
+          <a:p>
+            <a:pPr marL="285750" indent="-285750">
+              <a:buFont typeface="Arial" panose="020B0604020202020204" pitchFamily="34" charset="0"/>
+              <a:buChar char="•"/>
+            </a:pPr>
+            <a:endParaRPr lang="en-US" dirty="0"/>
+          </a:p>
+        </p:txBody>
+      </p:sp>
+      <p:pic>
+        <p:nvPicPr>
+          <p:cNvPr id="7" name="Picture 6">
+            <a:extLst>
+              <a:ext uri="{FF2B5EF4-FFF2-40B4-BE49-F238E27FC236}">
+                <a16:creationId xmlns:a16="http://schemas.microsoft.com/office/drawing/2014/main" id="{49F55AE3-64CE-4938-9DA8-7BAB0B7A7D81}"/>
+              </a:ext>
+            </a:extLst>
+          </p:cNvPr>
+          <p:cNvPicPr>
+            <a:picLocks noChangeAspect="1"/>
+          </p:cNvPicPr>
+          <p:nvPr/>
+        </p:nvPicPr>
+        <p:blipFill rotWithShape="1">
+          <a:blip r:embed="rId3">
+            <a:extLst>
+              <a:ext uri="{28A0092B-C50C-407E-A947-70E740481C1C}">
+                <a14:useLocalDpi xmlns:a14="http://schemas.microsoft.com/office/drawing/2010/main" val="0"/>
+              </a:ext>
+            </a:extLst>
+          </a:blip>
+          <a:srcRect l="82741" b="67692"/>
+          <a:stretch/>
+        </p:blipFill>
+        <p:spPr>
+          <a:xfrm>
+            <a:off x="8674311" y="1149289"/>
+            <a:ext cx="1669014" cy="1965945"/>
+          </a:xfrm>
+          <a:prstGeom prst="rect">
+            <a:avLst/>
+          </a:prstGeom>
+        </p:spPr>
+      </p:pic>
+      <p:sp>
+        <p:nvSpPr>
+          <p:cNvPr id="8" name="TextBox 7">
+            <a:extLst>
+              <a:ext uri="{FF2B5EF4-FFF2-40B4-BE49-F238E27FC236}">
+                <a16:creationId xmlns:a16="http://schemas.microsoft.com/office/drawing/2014/main" id="{F07CDC73-BABD-4E5C-B927-4C193DCDB27E}"/>
+              </a:ext>
+            </a:extLst>
+          </p:cNvPr>
+          <p:cNvSpPr txBox="1"/>
+          <p:nvPr/>
+        </p:nvSpPr>
+        <p:spPr>
+          <a:xfrm>
+            <a:off x="464235" y="406381"/>
+            <a:ext cx="11254154" cy="646331"/>
+          </a:xfrm>
+          <a:prstGeom prst="rect">
+            <a:avLst/>
+          </a:prstGeom>
+          <a:noFill/>
+        </p:spPr>
+        <p:txBody>
+          <a:bodyPr wrap="square" rtlCol="0">
+            <a:spAutoFit/>
+          </a:bodyPr>
+          <a:lstStyle/>
+          <a:p>
+            <a:pPr algn="ctr"/>
+            <a:r>
+              <a:rPr lang="en-US" sz="3600" b="1" dirty="0"/>
+              <a:t>RESULTS:  TRENDS BY REGION (Comparison)</a:t>
+            </a:r>
+          </a:p>
+        </p:txBody>
+      </p:sp>
+    </p:spTree>
+    <p:extLst>
+      <p:ext uri="{BB962C8B-B14F-4D97-AF65-F5344CB8AC3E}">
+        <p14:creationId xmlns:p14="http://schemas.microsoft.com/office/powerpoint/2010/main" val="1483260325"/>
+      </p:ext>
+    </p:extLst>
+  </p:cSld>
+  <p:clrMapOvr>
+    <a:masterClrMapping/>
+  </p:clrMapOvr>
+</p:sld>
+</file>
+
+<file path=ppt/slides/slide13.xml><?xml version="1.0" encoding="utf-8"?>
 <p:sld xmlns:a="http://schemas.openxmlformats.org/drawingml/2006/main" xmlns:r="http://schemas.openxmlformats.org/officeDocument/2006/relationships" xmlns:p="http://schemas.openxmlformats.org/presentationml/2006/main">
   <p:cSld>
     <p:spTree>
@@ -4362,569 +4884,6 @@
 </p:sld>
 </file>
 
-<file path=ppt/slides/slide11.xml><?xml version="1.0" encoding="utf-8"?>
-<p:sld xmlns:a="http://schemas.openxmlformats.org/drawingml/2006/main" xmlns:r="http://schemas.openxmlformats.org/officeDocument/2006/relationships" xmlns:p="http://schemas.openxmlformats.org/presentationml/2006/main">
-  <p:cSld>
-    <p:spTree>
-      <p:nvGrpSpPr>
-        <p:cNvPr id="1" name=""/>
-        <p:cNvGrpSpPr/>
-        <p:nvPr/>
-      </p:nvGrpSpPr>
-      <p:grpSpPr>
-        <a:xfrm>
-          <a:off x="0" y="0"/>
-          <a:ext cx="0" cy="0"/>
-          <a:chOff x="0" y="0"/>
-          <a:chExt cx="0" cy="0"/>
-        </a:xfrm>
-      </p:grpSpPr>
-      <p:sp>
-        <p:nvSpPr>
-          <p:cNvPr id="3" name="Content Placeholder 2">
-            <a:extLst>
-              <a:ext uri="{FF2B5EF4-FFF2-40B4-BE49-F238E27FC236}">
-                <a16:creationId xmlns:a16="http://schemas.microsoft.com/office/drawing/2014/main" id="{16A55A67-24DF-45F4-8C10-25F925D8C1A7}"/>
-              </a:ext>
-            </a:extLst>
-          </p:cNvPr>
-          <p:cNvSpPr>
-            <a:spLocks noGrp="1"/>
-          </p:cNvSpPr>
-          <p:nvPr>
-            <p:ph idx="1"/>
-          </p:nvPr>
-        </p:nvSpPr>
-        <p:spPr>
-          <a:xfrm>
-            <a:off x="464235" y="1101477"/>
-            <a:ext cx="11310423" cy="907392"/>
-          </a:xfrm>
-        </p:spPr>
-        <p:txBody>
-          <a:bodyPr>
-            <a:normAutofit/>
-          </a:bodyPr>
-          <a:lstStyle/>
-          <a:p>
-            <a:pPr marL="0" lvl="0" indent="0" algn="ctr">
-              <a:buNone/>
-            </a:pPr>
-            <a:r>
-              <a:rPr lang="en-US" sz="2400" dirty="0"/>
-              <a:t>Which entertainment subcategories have the highest consumer expenditure by age?</a:t>
-            </a:r>
-          </a:p>
-          <a:p>
-            <a:pPr marL="0" lvl="0" indent="0" algn="ctr">
-              <a:buNone/>
-            </a:pPr>
-            <a:endParaRPr lang="en-US" sz="2400" dirty="0"/>
-          </a:p>
-        </p:txBody>
-      </p:sp>
-      <p:pic>
-        <p:nvPicPr>
-          <p:cNvPr id="7" name="Picture 6">
-            <a:extLst>
-              <a:ext uri="{FF2B5EF4-FFF2-40B4-BE49-F238E27FC236}">
-                <a16:creationId xmlns:a16="http://schemas.microsoft.com/office/drawing/2014/main" id="{11D4FCCC-527A-40BC-A025-A37F38499FAB}"/>
-              </a:ext>
-            </a:extLst>
-          </p:cNvPr>
-          <p:cNvPicPr>
-            <a:picLocks noChangeAspect="1"/>
-          </p:cNvPicPr>
-          <p:nvPr/>
-        </p:nvPicPr>
-        <p:blipFill rotWithShape="1">
-          <a:blip r:embed="rId2">
-            <a:extLst>
-              <a:ext uri="{28A0092B-C50C-407E-A947-70E740481C1C}">
-                <a14:useLocalDpi xmlns:a14="http://schemas.microsoft.com/office/drawing/2010/main" val="0"/>
-              </a:ext>
-            </a:extLst>
-          </a:blip>
-          <a:srcRect l="10642" t="-490" r="13307" b="12026"/>
-          <a:stretch/>
-        </p:blipFill>
-        <p:spPr>
-          <a:xfrm>
-            <a:off x="6555545" y="1906263"/>
-            <a:ext cx="4174534" cy="3237342"/>
-          </a:xfrm>
-          <a:prstGeom prst="rect">
-            <a:avLst/>
-          </a:prstGeom>
-        </p:spPr>
-      </p:pic>
-      <p:pic>
-        <p:nvPicPr>
-          <p:cNvPr id="9" name="Picture 8">
-            <a:extLst>
-              <a:ext uri="{FF2B5EF4-FFF2-40B4-BE49-F238E27FC236}">
-                <a16:creationId xmlns:a16="http://schemas.microsoft.com/office/drawing/2014/main" id="{9B2E6485-C178-4E3C-888C-D735D65532DC}"/>
-              </a:ext>
-            </a:extLst>
-          </p:cNvPr>
-          <p:cNvPicPr>
-            <a:picLocks noChangeAspect="1"/>
-          </p:cNvPicPr>
-          <p:nvPr/>
-        </p:nvPicPr>
-        <p:blipFill rotWithShape="1">
-          <a:blip r:embed="rId3">
-            <a:extLst>
-              <a:ext uri="{28A0092B-C50C-407E-A947-70E740481C1C}">
-                <a14:useLocalDpi xmlns:a14="http://schemas.microsoft.com/office/drawing/2010/main" val="0"/>
-              </a:ext>
-            </a:extLst>
-          </a:blip>
-          <a:srcRect/>
-          <a:stretch/>
-        </p:blipFill>
-        <p:spPr>
-          <a:xfrm>
-            <a:off x="691512" y="2057635"/>
-            <a:ext cx="5947751" cy="4259569"/>
-          </a:xfrm>
-          <a:prstGeom prst="rect">
-            <a:avLst/>
-          </a:prstGeom>
-        </p:spPr>
-      </p:pic>
-      <p:sp>
-        <p:nvSpPr>
-          <p:cNvPr id="10" name="TextBox 9">
-            <a:extLst>
-              <a:ext uri="{FF2B5EF4-FFF2-40B4-BE49-F238E27FC236}">
-                <a16:creationId xmlns:a16="http://schemas.microsoft.com/office/drawing/2014/main" id="{F69CEA7A-FC90-4F9C-B4CC-DEA06B2A70DE}"/>
-              </a:ext>
-            </a:extLst>
-          </p:cNvPr>
-          <p:cNvSpPr txBox="1"/>
-          <p:nvPr/>
-        </p:nvSpPr>
-        <p:spPr>
-          <a:xfrm>
-            <a:off x="464235" y="406381"/>
-            <a:ext cx="11254154" cy="646331"/>
-          </a:xfrm>
-          <a:prstGeom prst="rect">
-            <a:avLst/>
-          </a:prstGeom>
-          <a:noFill/>
-        </p:spPr>
-        <p:txBody>
-          <a:bodyPr wrap="square" rtlCol="0">
-            <a:spAutoFit/>
-          </a:bodyPr>
-          <a:lstStyle/>
-          <a:p>
-            <a:pPr algn="ctr"/>
-            <a:r>
-              <a:rPr lang="en-US" sz="3600" b="1" dirty="0"/>
-              <a:t>RESULTS:  AGE</a:t>
-            </a:r>
-          </a:p>
-        </p:txBody>
-      </p:sp>
-    </p:spTree>
-    <p:extLst>
-      <p:ext uri="{BB962C8B-B14F-4D97-AF65-F5344CB8AC3E}">
-        <p14:creationId xmlns:p14="http://schemas.microsoft.com/office/powerpoint/2010/main" val="567949627"/>
-      </p:ext>
-    </p:extLst>
-  </p:cSld>
-  <p:clrMapOvr>
-    <a:masterClrMapping/>
-  </p:clrMapOvr>
-</p:sld>
-</file>
-
-<file path=ppt/slides/slide12.xml><?xml version="1.0" encoding="utf-8"?>
-<p:sld xmlns:a="http://schemas.openxmlformats.org/drawingml/2006/main" xmlns:r="http://schemas.openxmlformats.org/officeDocument/2006/relationships" xmlns:p="http://schemas.openxmlformats.org/presentationml/2006/main">
-  <p:cSld>
-    <p:spTree>
-      <p:nvGrpSpPr>
-        <p:cNvPr id="1" name=""/>
-        <p:cNvGrpSpPr/>
-        <p:nvPr/>
-      </p:nvGrpSpPr>
-      <p:grpSpPr>
-        <a:xfrm>
-          <a:off x="0" y="0"/>
-          <a:ext cx="0" cy="0"/>
-          <a:chOff x="0" y="0"/>
-          <a:chExt cx="0" cy="0"/>
-        </a:xfrm>
-      </p:grpSpPr>
-      <p:sp>
-        <p:nvSpPr>
-          <p:cNvPr id="3" name="Content Placeholder 2">
-            <a:extLst>
-              <a:ext uri="{FF2B5EF4-FFF2-40B4-BE49-F238E27FC236}">
-                <a16:creationId xmlns:a16="http://schemas.microsoft.com/office/drawing/2014/main" id="{16A55A67-24DF-45F4-8C10-25F925D8C1A7}"/>
-              </a:ext>
-            </a:extLst>
-          </p:cNvPr>
-          <p:cNvSpPr>
-            <a:spLocks noGrp="1"/>
-          </p:cNvSpPr>
-          <p:nvPr>
-            <p:ph idx="1"/>
-          </p:nvPr>
-        </p:nvSpPr>
-        <p:spPr>
-          <a:xfrm>
-            <a:off x="508933" y="1143635"/>
-            <a:ext cx="11223520" cy="817187"/>
-          </a:xfrm>
-        </p:spPr>
-        <p:txBody>
-          <a:bodyPr>
-            <a:normAutofit/>
-          </a:bodyPr>
-          <a:lstStyle/>
-          <a:p>
-            <a:pPr marL="0" lvl="0" indent="0" algn="ctr">
-              <a:buNone/>
-            </a:pPr>
-            <a:r>
-              <a:rPr lang="en-US" sz="2400" dirty="0"/>
-              <a:t>What is the % of average total expenditure spent on entertainment by age group? </a:t>
-            </a:r>
-          </a:p>
-        </p:txBody>
-      </p:sp>
-      <p:pic>
-        <p:nvPicPr>
-          <p:cNvPr id="5" name="Picture 4">
-            <a:extLst>
-              <a:ext uri="{FF2B5EF4-FFF2-40B4-BE49-F238E27FC236}">
-                <a16:creationId xmlns:a16="http://schemas.microsoft.com/office/drawing/2014/main" id="{7EE1222D-5F54-4D3B-B8D3-7C989A8883A3}"/>
-              </a:ext>
-            </a:extLst>
-          </p:cNvPr>
-          <p:cNvPicPr>
-            <a:picLocks noChangeAspect="1"/>
-          </p:cNvPicPr>
-          <p:nvPr/>
-        </p:nvPicPr>
-        <p:blipFill rotWithShape="1">
-          <a:blip r:embed="rId2">
-            <a:extLst>
-              <a:ext uri="{28A0092B-C50C-407E-A947-70E740481C1C}">
-                <a14:useLocalDpi xmlns:a14="http://schemas.microsoft.com/office/drawing/2010/main" val="0"/>
-              </a:ext>
-            </a:extLst>
-          </a:blip>
-          <a:srcRect l="-2166" t="-928" r="9253" b="928"/>
-          <a:stretch/>
-        </p:blipFill>
-        <p:spPr>
-          <a:xfrm>
-            <a:off x="2067951" y="1552228"/>
-            <a:ext cx="6639951" cy="4764258"/>
-          </a:xfrm>
-          <a:prstGeom prst="rect">
-            <a:avLst/>
-          </a:prstGeom>
-        </p:spPr>
-      </p:pic>
-      <p:sp>
-        <p:nvSpPr>
-          <p:cNvPr id="6" name="TextBox 5">
-            <a:extLst>
-              <a:ext uri="{FF2B5EF4-FFF2-40B4-BE49-F238E27FC236}">
-                <a16:creationId xmlns:a16="http://schemas.microsoft.com/office/drawing/2014/main" id="{A3E2DB8A-DD3B-4EBC-9B3D-30289C98C5D7}"/>
-              </a:ext>
-            </a:extLst>
-          </p:cNvPr>
-          <p:cNvSpPr txBox="1"/>
-          <p:nvPr/>
-        </p:nvSpPr>
-        <p:spPr>
-          <a:xfrm>
-            <a:off x="464235" y="406381"/>
-            <a:ext cx="11254154" cy="646331"/>
-          </a:xfrm>
-          <a:prstGeom prst="rect">
-            <a:avLst/>
-          </a:prstGeom>
-          <a:noFill/>
-        </p:spPr>
-        <p:txBody>
-          <a:bodyPr wrap="square" rtlCol="0">
-            <a:spAutoFit/>
-          </a:bodyPr>
-          <a:lstStyle/>
-          <a:p>
-            <a:pPr algn="ctr"/>
-            <a:r>
-              <a:rPr lang="en-US" sz="3600" b="1" dirty="0"/>
-              <a:t>RESULTS:  AGE</a:t>
-            </a:r>
-          </a:p>
-        </p:txBody>
-      </p:sp>
-    </p:spTree>
-    <p:extLst>
-      <p:ext uri="{BB962C8B-B14F-4D97-AF65-F5344CB8AC3E}">
-        <p14:creationId xmlns:p14="http://schemas.microsoft.com/office/powerpoint/2010/main" val="2460618146"/>
-      </p:ext>
-    </p:extLst>
-  </p:cSld>
-  <p:clrMapOvr>
-    <a:masterClrMapping/>
-  </p:clrMapOvr>
-</p:sld>
-</file>
-
-<file path=ppt/slides/slide13.xml><?xml version="1.0" encoding="utf-8"?>
-<p:sld xmlns:a="http://schemas.openxmlformats.org/drawingml/2006/main" xmlns:r="http://schemas.openxmlformats.org/officeDocument/2006/relationships" xmlns:p="http://schemas.openxmlformats.org/presentationml/2006/main">
-  <p:cSld>
-    <p:spTree>
-      <p:nvGrpSpPr>
-        <p:cNvPr id="1" name=""/>
-        <p:cNvGrpSpPr/>
-        <p:nvPr/>
-      </p:nvGrpSpPr>
-      <p:grpSpPr>
-        <a:xfrm>
-          <a:off x="0" y="0"/>
-          <a:ext cx="0" cy="0"/>
-          <a:chOff x="0" y="0"/>
-          <a:chExt cx="0" cy="0"/>
-        </a:xfrm>
-      </p:grpSpPr>
-      <p:sp>
-        <p:nvSpPr>
-          <p:cNvPr id="3" name="Content Placeholder 2">
-            <a:extLst>
-              <a:ext uri="{FF2B5EF4-FFF2-40B4-BE49-F238E27FC236}">
-                <a16:creationId xmlns:a16="http://schemas.microsoft.com/office/drawing/2014/main" id="{16A55A67-24DF-45F4-8C10-25F925D8C1A7}"/>
-              </a:ext>
-            </a:extLst>
-          </p:cNvPr>
-          <p:cNvSpPr>
-            <a:spLocks noGrp="1"/>
-          </p:cNvSpPr>
-          <p:nvPr>
-            <p:ph idx="1"/>
-          </p:nvPr>
-        </p:nvSpPr>
-        <p:spPr>
-          <a:xfrm>
-            <a:off x="505810" y="1077877"/>
-            <a:ext cx="11121401" cy="732783"/>
-          </a:xfrm>
-        </p:spPr>
-        <p:txBody>
-          <a:bodyPr>
-            <a:normAutofit/>
-          </a:bodyPr>
-          <a:lstStyle/>
-          <a:p>
-            <a:pPr marL="0" lvl="0" indent="0" algn="ctr">
-              <a:buNone/>
-            </a:pPr>
-            <a:r>
-              <a:rPr lang="en-US" sz="2400" dirty="0"/>
-              <a:t>Which entertainment subcategories have the highest consumer expenditure by race?</a:t>
-            </a:r>
-          </a:p>
-        </p:txBody>
-      </p:sp>
-      <p:pic>
-        <p:nvPicPr>
-          <p:cNvPr id="10" name="Picture 9">
-            <a:extLst>
-              <a:ext uri="{FF2B5EF4-FFF2-40B4-BE49-F238E27FC236}">
-                <a16:creationId xmlns:a16="http://schemas.microsoft.com/office/drawing/2014/main" id="{0BD2AB97-6168-4B6E-8BC7-009750188B30}"/>
-              </a:ext>
-            </a:extLst>
-          </p:cNvPr>
-          <p:cNvPicPr>
-            <a:picLocks noChangeAspect="1"/>
-          </p:cNvPicPr>
-          <p:nvPr/>
-        </p:nvPicPr>
-        <p:blipFill rotWithShape="1">
-          <a:blip r:embed="rId2">
-            <a:extLst>
-              <a:ext uri="{28A0092B-C50C-407E-A947-70E740481C1C}">
-                <a14:useLocalDpi xmlns:a14="http://schemas.microsoft.com/office/drawing/2010/main" val="0"/>
-              </a:ext>
-            </a:extLst>
-          </a:blip>
-          <a:srcRect b="91560"/>
-          <a:stretch/>
-        </p:blipFill>
-        <p:spPr>
-          <a:xfrm>
-            <a:off x="2456122" y="1569912"/>
-            <a:ext cx="9262267" cy="539298"/>
-          </a:xfrm>
-          <a:prstGeom prst="rect">
-            <a:avLst/>
-          </a:prstGeom>
-        </p:spPr>
-      </p:pic>
-      <p:pic>
-        <p:nvPicPr>
-          <p:cNvPr id="11" name="Picture 10">
-            <a:extLst>
-              <a:ext uri="{FF2B5EF4-FFF2-40B4-BE49-F238E27FC236}">
-                <a16:creationId xmlns:a16="http://schemas.microsoft.com/office/drawing/2014/main" id="{28121C83-2D06-4E6A-85DA-8170DF91EF65}"/>
-              </a:ext>
-            </a:extLst>
-          </p:cNvPr>
-          <p:cNvPicPr>
-            <a:picLocks noChangeAspect="1"/>
-          </p:cNvPicPr>
-          <p:nvPr/>
-        </p:nvPicPr>
-        <p:blipFill rotWithShape="1">
-          <a:blip r:embed="rId2">
-            <a:extLst>
-              <a:ext uri="{28A0092B-C50C-407E-A947-70E740481C1C}">
-                <a14:useLocalDpi xmlns:a14="http://schemas.microsoft.com/office/drawing/2010/main" val="0"/>
-              </a:ext>
-            </a:extLst>
-          </a:blip>
-          <a:srcRect l="66299" t="9228" b="57628"/>
-          <a:stretch/>
-        </p:blipFill>
-        <p:spPr>
-          <a:xfrm>
-            <a:off x="5135644" y="2327860"/>
-            <a:ext cx="2331174" cy="1683976"/>
-          </a:xfrm>
-          <a:prstGeom prst="rect">
-            <a:avLst/>
-          </a:prstGeom>
-        </p:spPr>
-      </p:pic>
-      <p:pic>
-        <p:nvPicPr>
-          <p:cNvPr id="12" name="Picture 11">
-            <a:extLst>
-              <a:ext uri="{FF2B5EF4-FFF2-40B4-BE49-F238E27FC236}">
-                <a16:creationId xmlns:a16="http://schemas.microsoft.com/office/drawing/2014/main" id="{44925520-4168-4BCB-BE27-289D2BB45D37}"/>
-              </a:ext>
-            </a:extLst>
-          </p:cNvPr>
-          <p:cNvPicPr>
-            <a:picLocks noChangeAspect="1"/>
-          </p:cNvPicPr>
-          <p:nvPr/>
-        </p:nvPicPr>
-        <p:blipFill rotWithShape="1">
-          <a:blip r:embed="rId2">
-            <a:extLst>
-              <a:ext uri="{28A0092B-C50C-407E-A947-70E740481C1C}">
-                <a14:useLocalDpi xmlns:a14="http://schemas.microsoft.com/office/drawing/2010/main" val="0"/>
-              </a:ext>
-            </a:extLst>
-          </a:blip>
-          <a:srcRect l="-610" t="8142" r="33726" b="755"/>
-          <a:stretch/>
-        </p:blipFill>
-        <p:spPr>
-          <a:xfrm>
-            <a:off x="594751" y="2327860"/>
-            <a:ext cx="4540893" cy="4123759"/>
-          </a:xfrm>
-          <a:prstGeom prst="rect">
-            <a:avLst/>
-          </a:prstGeom>
-        </p:spPr>
-      </p:pic>
-      <p:sp>
-        <p:nvSpPr>
-          <p:cNvPr id="13" name="TextBox 12">
-            <a:extLst>
-              <a:ext uri="{FF2B5EF4-FFF2-40B4-BE49-F238E27FC236}">
-                <a16:creationId xmlns:a16="http://schemas.microsoft.com/office/drawing/2014/main" id="{ECECC784-757A-461F-9317-2C5ADA826F82}"/>
-              </a:ext>
-            </a:extLst>
-          </p:cNvPr>
-          <p:cNvSpPr txBox="1"/>
-          <p:nvPr/>
-        </p:nvSpPr>
-        <p:spPr>
-          <a:xfrm>
-            <a:off x="464235" y="406381"/>
-            <a:ext cx="11254154" cy="646331"/>
-          </a:xfrm>
-          <a:prstGeom prst="rect">
-            <a:avLst/>
-          </a:prstGeom>
-          <a:noFill/>
-        </p:spPr>
-        <p:txBody>
-          <a:bodyPr wrap="square" rtlCol="0">
-            <a:spAutoFit/>
-          </a:bodyPr>
-          <a:lstStyle/>
-          <a:p>
-            <a:pPr algn="ctr"/>
-            <a:r>
-              <a:rPr lang="en-US" sz="3600" b="1" dirty="0"/>
-              <a:t>RESULTS:  RACE</a:t>
-            </a:r>
-          </a:p>
-        </p:txBody>
-      </p:sp>
-      <p:pic>
-        <p:nvPicPr>
-          <p:cNvPr id="7" name="Picture 6">
-            <a:extLst>
-              <a:ext uri="{FF2B5EF4-FFF2-40B4-BE49-F238E27FC236}">
-                <a16:creationId xmlns:a16="http://schemas.microsoft.com/office/drawing/2014/main" id="{60300254-FA1C-48D1-8942-3FFC58C6A405}"/>
-              </a:ext>
-            </a:extLst>
-          </p:cNvPr>
-          <p:cNvPicPr>
-            <a:picLocks noChangeAspect="1"/>
-          </p:cNvPicPr>
-          <p:nvPr/>
-        </p:nvPicPr>
-        <p:blipFill rotWithShape="1">
-          <a:blip r:embed="rId3">
-            <a:extLst>
-              <a:ext uri="{28A0092B-C50C-407E-A947-70E740481C1C}">
-                <a14:useLocalDpi xmlns:a14="http://schemas.microsoft.com/office/drawing/2010/main" val="0"/>
-              </a:ext>
-            </a:extLst>
-          </a:blip>
-          <a:srcRect t="9834" r="32124" b="-738"/>
-          <a:stretch/>
-        </p:blipFill>
-        <p:spPr>
-          <a:xfrm>
-            <a:off x="7270423" y="2397303"/>
-            <a:ext cx="4447966" cy="3971340"/>
-          </a:xfrm>
-          <a:prstGeom prst="rect">
-            <a:avLst/>
-          </a:prstGeom>
-        </p:spPr>
-      </p:pic>
-    </p:spTree>
-    <p:extLst>
-      <p:ext uri="{BB962C8B-B14F-4D97-AF65-F5344CB8AC3E}">
-        <p14:creationId xmlns:p14="http://schemas.microsoft.com/office/powerpoint/2010/main" val="4173381152"/>
-      </p:ext>
-    </p:extLst>
-  </p:cSld>
-  <p:clrMapOvr>
-    <a:masterClrMapping/>
-  </p:clrMapOvr>
-</p:sld>
-</file>
-
 <file path=ppt/slides/slide14.xml><?xml version="1.0" encoding="utf-8"?>
 <p:sld xmlns:a="http://schemas.openxmlformats.org/drawingml/2006/main" xmlns:r="http://schemas.openxmlformats.org/officeDocument/2006/relationships" xmlns:p="http://schemas.openxmlformats.org/presentationml/2006/main">
   <p:cSld>
@@ -4960,8 +4919,8 @@
         </p:nvSpPr>
         <p:spPr>
           <a:xfrm>
-            <a:off x="436098" y="1253331"/>
-            <a:ext cx="11296356" cy="575469"/>
+            <a:off x="464235" y="1101477"/>
+            <a:ext cx="11310423" cy="907392"/>
           </a:xfrm>
         </p:spPr>
         <p:txBody>
@@ -4975,17 +4934,23 @@
             </a:pPr>
             <a:r>
               <a:rPr lang="en-US" sz="2400" dirty="0"/>
-              <a:t>What is the % of average total expenditure spent on entertainment by race? </a:t>
-            </a:r>
+              <a:t>Which entertainment subcategories have the highest consumer expenditure by age?</a:t>
+            </a:r>
+          </a:p>
+          <a:p>
+            <a:pPr marL="0" lvl="0" indent="0" algn="ctr">
+              <a:buNone/>
+            </a:pPr>
+            <a:endParaRPr lang="en-US" sz="2400" dirty="0"/>
           </a:p>
         </p:txBody>
       </p:sp>
       <p:pic>
         <p:nvPicPr>
-          <p:cNvPr id="5" name="Picture 4">
-            <a:extLst>
-              <a:ext uri="{FF2B5EF4-FFF2-40B4-BE49-F238E27FC236}">
-                <a16:creationId xmlns:a16="http://schemas.microsoft.com/office/drawing/2014/main" id="{D3DA7021-FEAD-4CB3-B73A-FC89C22A85E9}"/>
+          <p:cNvPr id="7" name="Picture 6">
+            <a:extLst>
+              <a:ext uri="{FF2B5EF4-FFF2-40B4-BE49-F238E27FC236}">
+                <a16:creationId xmlns:a16="http://schemas.microsoft.com/office/drawing/2014/main" id="{11D4FCCC-527A-40BC-A025-A37F38499FAB}"/>
               </a:ext>
             </a:extLst>
           </p:cNvPr>
@@ -4994,7 +4959,7 @@
           </p:cNvPicPr>
           <p:nvPr/>
         </p:nvPicPr>
-        <p:blipFill>
+        <p:blipFill rotWithShape="1">
           <a:blip r:embed="rId2">
             <a:extLst>
               <a:ext uri="{28A0092B-C50C-407E-A947-70E740481C1C}">
@@ -5002,26 +4967,60 @@
               </a:ext>
             </a:extLst>
           </a:blip>
-          <a:stretch>
-            <a:fillRect/>
-          </a:stretch>
+          <a:srcRect l="10642" t="-490" r="13307" b="12026"/>
+          <a:stretch/>
         </p:blipFill>
         <p:spPr>
           <a:xfrm>
-            <a:off x="1917270" y="1828800"/>
-            <a:ext cx="6874453" cy="4582968"/>
+            <a:off x="6555545" y="1906263"/>
+            <a:ext cx="4174534" cy="3237342"/>
           </a:xfrm>
           <a:prstGeom prst="rect">
             <a:avLst/>
           </a:prstGeom>
         </p:spPr>
       </p:pic>
-      <p:sp>
-        <p:nvSpPr>
-          <p:cNvPr id="6" name="TextBox 5">
-            <a:extLst>
-              <a:ext uri="{FF2B5EF4-FFF2-40B4-BE49-F238E27FC236}">
-                <a16:creationId xmlns:a16="http://schemas.microsoft.com/office/drawing/2014/main" id="{BB1111A2-D7AE-4EF4-A151-BD5FAA6D343C}"/>
+      <p:pic>
+        <p:nvPicPr>
+          <p:cNvPr id="9" name="Picture 8">
+            <a:extLst>
+              <a:ext uri="{FF2B5EF4-FFF2-40B4-BE49-F238E27FC236}">
+                <a16:creationId xmlns:a16="http://schemas.microsoft.com/office/drawing/2014/main" id="{9B2E6485-C178-4E3C-888C-D735D65532DC}"/>
+              </a:ext>
+            </a:extLst>
+          </p:cNvPr>
+          <p:cNvPicPr>
+            <a:picLocks noChangeAspect="1"/>
+          </p:cNvPicPr>
+          <p:nvPr/>
+        </p:nvPicPr>
+        <p:blipFill rotWithShape="1">
+          <a:blip r:embed="rId3">
+            <a:extLst>
+              <a:ext uri="{28A0092B-C50C-407E-A947-70E740481C1C}">
+                <a14:useLocalDpi xmlns:a14="http://schemas.microsoft.com/office/drawing/2010/main" val="0"/>
+              </a:ext>
+            </a:extLst>
+          </a:blip>
+          <a:srcRect/>
+          <a:stretch/>
+        </p:blipFill>
+        <p:spPr>
+          <a:xfrm>
+            <a:off x="691512" y="2057635"/>
+            <a:ext cx="5947751" cy="4259569"/>
+          </a:xfrm>
+          <a:prstGeom prst="rect">
+            <a:avLst/>
+          </a:prstGeom>
+        </p:spPr>
+      </p:pic>
+      <p:sp>
+        <p:nvSpPr>
+          <p:cNvPr id="10" name="TextBox 9">
+            <a:extLst>
+              <a:ext uri="{FF2B5EF4-FFF2-40B4-BE49-F238E27FC236}">
+                <a16:creationId xmlns:a16="http://schemas.microsoft.com/office/drawing/2014/main" id="{F69CEA7A-FC90-4F9C-B4CC-DEA06B2A70DE}"/>
               </a:ext>
             </a:extLst>
           </p:cNvPr>
@@ -5047,7 +5046,7 @@
             <a:pPr algn="ctr"/>
             <a:r>
               <a:rPr lang="en-US" sz="3600" b="1" dirty="0"/>
-              <a:t>RESULTS:  RACE</a:t>
+              <a:t>RESULTS:  AGE</a:t>
             </a:r>
           </a:p>
         </p:txBody>
@@ -5055,7 +5054,7 @@
     </p:spTree>
     <p:extLst>
       <p:ext uri="{BB962C8B-B14F-4D97-AF65-F5344CB8AC3E}">
-        <p14:creationId xmlns:p14="http://schemas.microsoft.com/office/powerpoint/2010/main" val="2667430094"/>
+        <p14:creationId xmlns:p14="http://schemas.microsoft.com/office/powerpoint/2010/main" val="567949627"/>
       </p:ext>
     </p:extLst>
   </p:cSld>
@@ -5100,8 +5099,8 @@
         </p:nvSpPr>
         <p:spPr>
           <a:xfrm>
-            <a:off x="412652" y="1045161"/>
-            <a:ext cx="11366696" cy="707886"/>
+            <a:off x="508933" y="1143635"/>
+            <a:ext cx="11223520" cy="817187"/>
           </a:xfrm>
         </p:spPr>
         <p:txBody>
@@ -5115,23 +5114,52 @@
             </a:pPr>
             <a:r>
               <a:rPr lang="en-US" sz="2400" dirty="0"/>
-              <a:t>Which entertainment subcategories have the highest consumer expenditures by region?</a:t>
-            </a:r>
-          </a:p>
-          <a:p>
-            <a:pPr marL="0" lvl="0" indent="0" algn="ctr">
-              <a:buNone/>
-            </a:pPr>
-            <a:endParaRPr lang="en-US" sz="2400" dirty="0"/>
-          </a:p>
-        </p:txBody>
-      </p:sp>
-      <p:sp>
-        <p:nvSpPr>
-          <p:cNvPr id="10" name="TextBox 9">
-            <a:extLst>
-              <a:ext uri="{FF2B5EF4-FFF2-40B4-BE49-F238E27FC236}">
-                <a16:creationId xmlns:a16="http://schemas.microsoft.com/office/drawing/2014/main" id="{21CE4D9E-2CD2-4E9B-AD7E-9F31344593C0}"/>
+              <a:t>What is the % of average total expenditure spent on entertainment by age group? </a:t>
+            </a:r>
+          </a:p>
+        </p:txBody>
+      </p:sp>
+      <p:pic>
+        <p:nvPicPr>
+          <p:cNvPr id="5" name="Picture 4">
+            <a:extLst>
+              <a:ext uri="{FF2B5EF4-FFF2-40B4-BE49-F238E27FC236}">
+                <a16:creationId xmlns:a16="http://schemas.microsoft.com/office/drawing/2014/main" id="{7EE1222D-5F54-4D3B-B8D3-7C989A8883A3}"/>
+              </a:ext>
+            </a:extLst>
+          </p:cNvPr>
+          <p:cNvPicPr>
+            <a:picLocks noChangeAspect="1"/>
+          </p:cNvPicPr>
+          <p:nvPr/>
+        </p:nvPicPr>
+        <p:blipFill rotWithShape="1">
+          <a:blip r:embed="rId2">
+            <a:extLst>
+              <a:ext uri="{28A0092B-C50C-407E-A947-70E740481C1C}">
+                <a14:useLocalDpi xmlns:a14="http://schemas.microsoft.com/office/drawing/2010/main" val="0"/>
+              </a:ext>
+            </a:extLst>
+          </a:blip>
+          <a:srcRect l="-2166" t="-928" r="9253" b="928"/>
+          <a:stretch/>
+        </p:blipFill>
+        <p:spPr>
+          <a:xfrm>
+            <a:off x="2067951" y="1552228"/>
+            <a:ext cx="6639951" cy="4764258"/>
+          </a:xfrm>
+          <a:prstGeom prst="rect">
+            <a:avLst/>
+          </a:prstGeom>
+        </p:spPr>
+      </p:pic>
+      <p:sp>
+        <p:nvSpPr>
+          <p:cNvPr id="6" name="TextBox 5">
+            <a:extLst>
+              <a:ext uri="{FF2B5EF4-FFF2-40B4-BE49-F238E27FC236}">
+                <a16:creationId xmlns:a16="http://schemas.microsoft.com/office/drawing/2014/main" id="{A3E2DB8A-DD3B-4EBC-9B3D-30289C98C5D7}"/>
               </a:ext>
             </a:extLst>
           </p:cNvPr>
@@ -5157,62 +5185,15 @@
             <a:pPr algn="ctr"/>
             <a:r>
               <a:rPr lang="en-US" sz="3600" b="1" dirty="0"/>
-              <a:t>RESULTS:  REGION</a:t>
-            </a:r>
-          </a:p>
-        </p:txBody>
-      </p:sp>
-      <p:pic>
-        <p:nvPicPr>
-          <p:cNvPr id="2050" name="Picture 2">
-            <a:extLst>
-              <a:ext uri="{FF2B5EF4-FFF2-40B4-BE49-F238E27FC236}">
-                <a16:creationId xmlns:a16="http://schemas.microsoft.com/office/drawing/2014/main" id="{AFD57600-9DA7-4B53-9EE2-9E82E7396E70}"/>
-              </a:ext>
-            </a:extLst>
-          </p:cNvPr>
-          <p:cNvPicPr>
-            <a:picLocks noChangeAspect="1" noChangeArrowheads="1"/>
-          </p:cNvPicPr>
-          <p:nvPr/>
-        </p:nvPicPr>
-        <p:blipFill>
-          <a:blip r:embed="rId2">
-            <a:extLst>
-              <a:ext uri="{28A0092B-C50C-407E-A947-70E740481C1C}">
-                <a14:useLocalDpi xmlns:a14="http://schemas.microsoft.com/office/drawing/2010/main" val="0"/>
-              </a:ext>
-            </a:extLst>
-          </a:blip>
-          <a:srcRect/>
-          <a:stretch>
-            <a:fillRect/>
-          </a:stretch>
-        </p:blipFill>
-        <p:spPr bwMode="auto">
-          <a:xfrm>
-            <a:off x="2475914" y="1981906"/>
-            <a:ext cx="7655170" cy="4469713"/>
-          </a:xfrm>
-          <a:prstGeom prst="rect">
-            <a:avLst/>
-          </a:prstGeom>
-          <a:noFill/>
-          <a:extLst>
-            <a:ext uri="{909E8E84-426E-40DD-AFC4-6F175D3DCCD1}">
-              <a14:hiddenFill xmlns:a14="http://schemas.microsoft.com/office/drawing/2010/main">
-                <a:solidFill>
-                  <a:srgbClr val="FFFFFF"/>
-                </a:solidFill>
-              </a14:hiddenFill>
-            </a:ext>
-          </a:extLst>
-        </p:spPr>
-      </p:pic>
+              <a:t>RESULTS:  AGE</a:t>
+            </a:r>
+          </a:p>
+        </p:txBody>
+      </p:sp>
     </p:spTree>
     <p:extLst>
       <p:ext uri="{BB962C8B-B14F-4D97-AF65-F5344CB8AC3E}">
-        <p14:creationId xmlns:p14="http://schemas.microsoft.com/office/powerpoint/2010/main" val="2506859037"/>
+        <p14:creationId xmlns:p14="http://schemas.microsoft.com/office/powerpoint/2010/main" val="2460618146"/>
       </p:ext>
     </p:extLst>
   </p:cSld>
@@ -5257,8 +5238,8 @@
         </p:nvSpPr>
         <p:spPr>
           <a:xfrm>
-            <a:off x="407964" y="1176905"/>
-            <a:ext cx="11366696" cy="707886"/>
+            <a:off x="505810" y="1077877"/>
+            <a:ext cx="11121401" cy="732783"/>
           </a:xfrm>
         </p:spPr>
         <p:txBody>
@@ -5272,23 +5253,122 @@
             </a:pPr>
             <a:r>
               <a:rPr lang="en-US" sz="2400" dirty="0"/>
-              <a:t>Which entertainment region has the highest consumer expenditure for entertainment?</a:t>
-            </a:r>
-          </a:p>
-          <a:p>
-            <a:pPr marL="0" lvl="0" indent="0" algn="ctr">
-              <a:buNone/>
-            </a:pPr>
-            <a:endParaRPr lang="en-US" sz="2400" dirty="0"/>
-          </a:p>
-        </p:txBody>
-      </p:sp>
-      <p:sp>
-        <p:nvSpPr>
-          <p:cNvPr id="10" name="TextBox 9">
-            <a:extLst>
-              <a:ext uri="{FF2B5EF4-FFF2-40B4-BE49-F238E27FC236}">
-                <a16:creationId xmlns:a16="http://schemas.microsoft.com/office/drawing/2014/main" id="{21CE4D9E-2CD2-4E9B-AD7E-9F31344593C0}"/>
+              <a:t>Which entertainment subcategories have the highest consumer expenditure by race?</a:t>
+            </a:r>
+          </a:p>
+        </p:txBody>
+      </p:sp>
+      <p:pic>
+        <p:nvPicPr>
+          <p:cNvPr id="10" name="Picture 9">
+            <a:extLst>
+              <a:ext uri="{FF2B5EF4-FFF2-40B4-BE49-F238E27FC236}">
+                <a16:creationId xmlns:a16="http://schemas.microsoft.com/office/drawing/2014/main" id="{0BD2AB97-6168-4B6E-8BC7-009750188B30}"/>
+              </a:ext>
+            </a:extLst>
+          </p:cNvPr>
+          <p:cNvPicPr>
+            <a:picLocks noChangeAspect="1"/>
+          </p:cNvPicPr>
+          <p:nvPr/>
+        </p:nvPicPr>
+        <p:blipFill rotWithShape="1">
+          <a:blip r:embed="rId2">
+            <a:extLst>
+              <a:ext uri="{28A0092B-C50C-407E-A947-70E740481C1C}">
+                <a14:useLocalDpi xmlns:a14="http://schemas.microsoft.com/office/drawing/2010/main" val="0"/>
+              </a:ext>
+            </a:extLst>
+          </a:blip>
+          <a:srcRect b="91560"/>
+          <a:stretch/>
+        </p:blipFill>
+        <p:spPr>
+          <a:xfrm>
+            <a:off x="2456122" y="1569912"/>
+            <a:ext cx="9262267" cy="539298"/>
+          </a:xfrm>
+          <a:prstGeom prst="rect">
+            <a:avLst/>
+          </a:prstGeom>
+        </p:spPr>
+      </p:pic>
+      <p:pic>
+        <p:nvPicPr>
+          <p:cNvPr id="11" name="Picture 10">
+            <a:extLst>
+              <a:ext uri="{FF2B5EF4-FFF2-40B4-BE49-F238E27FC236}">
+                <a16:creationId xmlns:a16="http://schemas.microsoft.com/office/drawing/2014/main" id="{28121C83-2D06-4E6A-85DA-8170DF91EF65}"/>
+              </a:ext>
+            </a:extLst>
+          </p:cNvPr>
+          <p:cNvPicPr>
+            <a:picLocks noChangeAspect="1"/>
+          </p:cNvPicPr>
+          <p:nvPr/>
+        </p:nvPicPr>
+        <p:blipFill rotWithShape="1">
+          <a:blip r:embed="rId2">
+            <a:extLst>
+              <a:ext uri="{28A0092B-C50C-407E-A947-70E740481C1C}">
+                <a14:useLocalDpi xmlns:a14="http://schemas.microsoft.com/office/drawing/2010/main" val="0"/>
+              </a:ext>
+            </a:extLst>
+          </a:blip>
+          <a:srcRect l="66299" t="9228" b="57628"/>
+          <a:stretch/>
+        </p:blipFill>
+        <p:spPr>
+          <a:xfrm>
+            <a:off x="5135644" y="2327860"/>
+            <a:ext cx="2331174" cy="1683976"/>
+          </a:xfrm>
+          <a:prstGeom prst="rect">
+            <a:avLst/>
+          </a:prstGeom>
+        </p:spPr>
+      </p:pic>
+      <p:pic>
+        <p:nvPicPr>
+          <p:cNvPr id="12" name="Picture 11">
+            <a:extLst>
+              <a:ext uri="{FF2B5EF4-FFF2-40B4-BE49-F238E27FC236}">
+                <a16:creationId xmlns:a16="http://schemas.microsoft.com/office/drawing/2014/main" id="{44925520-4168-4BCB-BE27-289D2BB45D37}"/>
+              </a:ext>
+            </a:extLst>
+          </p:cNvPr>
+          <p:cNvPicPr>
+            <a:picLocks noChangeAspect="1"/>
+          </p:cNvPicPr>
+          <p:nvPr/>
+        </p:nvPicPr>
+        <p:blipFill rotWithShape="1">
+          <a:blip r:embed="rId2">
+            <a:extLst>
+              <a:ext uri="{28A0092B-C50C-407E-A947-70E740481C1C}">
+                <a14:useLocalDpi xmlns:a14="http://schemas.microsoft.com/office/drawing/2010/main" val="0"/>
+              </a:ext>
+            </a:extLst>
+          </a:blip>
+          <a:srcRect l="-610" t="8142" r="33726" b="755"/>
+          <a:stretch/>
+        </p:blipFill>
+        <p:spPr>
+          <a:xfrm>
+            <a:off x="594751" y="2327860"/>
+            <a:ext cx="4540893" cy="4123759"/>
+          </a:xfrm>
+          <a:prstGeom prst="rect">
+            <a:avLst/>
+          </a:prstGeom>
+        </p:spPr>
+      </p:pic>
+      <p:sp>
+        <p:nvSpPr>
+          <p:cNvPr id="13" name="TextBox 12">
+            <a:extLst>
+              <a:ext uri="{FF2B5EF4-FFF2-40B4-BE49-F238E27FC236}">
+                <a16:creationId xmlns:a16="http://schemas.microsoft.com/office/drawing/2014/main" id="{ECECC784-757A-461F-9317-2C5ADA826F82}"/>
               </a:ext>
             </a:extLst>
           </p:cNvPr>
@@ -5314,62 +5394,50 @@
             <a:pPr algn="ctr"/>
             <a:r>
               <a:rPr lang="en-US" sz="3600" b="1" dirty="0"/>
-              <a:t>RESULTS:  REGION</a:t>
+              <a:t>RESULTS:  RACE</a:t>
             </a:r>
           </a:p>
         </p:txBody>
       </p:sp>
       <p:pic>
         <p:nvPicPr>
-          <p:cNvPr id="3074" name="Picture 2">
-            <a:extLst>
-              <a:ext uri="{FF2B5EF4-FFF2-40B4-BE49-F238E27FC236}">
-                <a16:creationId xmlns:a16="http://schemas.microsoft.com/office/drawing/2014/main" id="{1706A220-8CAE-436F-8489-CD3EE7C1A702}"/>
+          <p:cNvPr id="7" name="Picture 6">
+            <a:extLst>
+              <a:ext uri="{FF2B5EF4-FFF2-40B4-BE49-F238E27FC236}">
+                <a16:creationId xmlns:a16="http://schemas.microsoft.com/office/drawing/2014/main" id="{60300254-FA1C-48D1-8942-3FFC58C6A405}"/>
               </a:ext>
             </a:extLst>
           </p:cNvPr>
           <p:cNvPicPr>
-            <a:picLocks noChangeAspect="1" noChangeArrowheads="1"/>
+            <a:picLocks noChangeAspect="1"/>
           </p:cNvPicPr>
           <p:nvPr/>
         </p:nvPicPr>
-        <p:blipFill>
-          <a:blip r:embed="rId2">
+        <p:blipFill rotWithShape="1">
+          <a:blip r:embed="rId3">
             <a:extLst>
               <a:ext uri="{28A0092B-C50C-407E-A947-70E740481C1C}">
                 <a14:useLocalDpi xmlns:a14="http://schemas.microsoft.com/office/drawing/2010/main" val="0"/>
               </a:ext>
             </a:extLst>
           </a:blip>
-          <a:srcRect/>
-          <a:stretch>
-            <a:fillRect/>
-          </a:stretch>
+          <a:srcRect t="9834" r="32124" b="-738"/>
+          <a:stretch/>
         </p:blipFill>
-        <p:spPr bwMode="auto">
-          <a:xfrm>
-            <a:off x="2618221" y="2008985"/>
-            <a:ext cx="6119446" cy="4314553"/>
+        <p:spPr>
+          <a:xfrm>
+            <a:off x="7270423" y="2397303"/>
+            <a:ext cx="4447966" cy="3971340"/>
           </a:xfrm>
           <a:prstGeom prst="rect">
             <a:avLst/>
           </a:prstGeom>
-          <a:noFill/>
-          <a:extLst>
-            <a:ext uri="{909E8E84-426E-40DD-AFC4-6F175D3DCCD1}">
-              <a14:hiddenFill xmlns:a14="http://schemas.microsoft.com/office/drawing/2010/main">
-                <a:solidFill>
-                  <a:srgbClr val="FFFFFF"/>
-                </a:solidFill>
-              </a14:hiddenFill>
-            </a:ext>
-          </a:extLst>
         </p:spPr>
       </p:pic>
     </p:spTree>
     <p:extLst>
       <p:ext uri="{BB962C8B-B14F-4D97-AF65-F5344CB8AC3E}">
-        <p14:creationId xmlns:p14="http://schemas.microsoft.com/office/powerpoint/2010/main" val="2564147352"/>
+        <p14:creationId xmlns:p14="http://schemas.microsoft.com/office/powerpoint/2010/main" val="4173381152"/>
       </p:ext>
     </p:extLst>
   </p:cSld>
@@ -5414,13 +5482,13 @@
         </p:nvSpPr>
         <p:spPr>
           <a:xfrm>
-            <a:off x="464235" y="1061191"/>
-            <a:ext cx="11254154" cy="646331"/>
+            <a:off x="436098" y="1253331"/>
+            <a:ext cx="11296356" cy="575469"/>
           </a:xfrm>
         </p:spPr>
         <p:txBody>
           <a:bodyPr>
-            <a:normAutofit fontScale="92500"/>
+            <a:normAutofit/>
           </a:bodyPr>
           <a:lstStyle/>
           <a:p>
@@ -5428,67 +5496,23 @@
               <a:buNone/>
             </a:pPr>
             <a:r>
-              <a:rPr lang="en-US" dirty="0"/>
-              <a:t>What is </a:t>
-            </a:r>
-            <a:r>
               <a:rPr lang="en-US" sz="2400" dirty="0"/>
-              <a:t>the</a:t>
-            </a:r>
-            <a:r>
-              <a:rPr lang="en-US" dirty="0"/>
-              <a:t> % of average total expenditure spent on entertainment by region? </a:t>
-            </a:r>
-          </a:p>
-        </p:txBody>
-      </p:sp>
-      <p:sp>
-        <p:nvSpPr>
-          <p:cNvPr id="5" name="TextBox 4">
-            <a:extLst>
-              <a:ext uri="{FF2B5EF4-FFF2-40B4-BE49-F238E27FC236}">
-                <a16:creationId xmlns:a16="http://schemas.microsoft.com/office/drawing/2014/main" id="{1597666D-83CD-4CB9-A2E8-F7A70ABBFC6C}"/>
-              </a:ext>
-            </a:extLst>
-          </p:cNvPr>
-          <p:cNvSpPr txBox="1"/>
-          <p:nvPr/>
-        </p:nvSpPr>
-        <p:spPr>
-          <a:xfrm>
-            <a:off x="464235" y="406381"/>
-            <a:ext cx="11254154" cy="646331"/>
-          </a:xfrm>
-          <a:prstGeom prst="rect">
-            <a:avLst/>
-          </a:prstGeom>
-          <a:noFill/>
-        </p:spPr>
-        <p:txBody>
-          <a:bodyPr wrap="square" rtlCol="0">
-            <a:spAutoFit/>
-          </a:bodyPr>
-          <a:lstStyle/>
-          <a:p>
-            <a:pPr algn="ctr"/>
-            <a:r>
-              <a:rPr lang="en-US" sz="3600" b="1" dirty="0"/>
-              <a:t>RESULTS:  REGION</a:t>
+              <a:t>What is the % of average total expenditure spent on entertainment by race? </a:t>
             </a:r>
           </a:p>
         </p:txBody>
       </p:sp>
       <p:pic>
         <p:nvPicPr>
-          <p:cNvPr id="4098" name="Picture 2">
-            <a:extLst>
-              <a:ext uri="{FF2B5EF4-FFF2-40B4-BE49-F238E27FC236}">
-                <a16:creationId xmlns:a16="http://schemas.microsoft.com/office/drawing/2014/main" id="{22F86C44-A419-423A-8D1A-9528C94219D3}"/>
+          <p:cNvPr id="5" name="Picture 4">
+            <a:extLst>
+              <a:ext uri="{FF2B5EF4-FFF2-40B4-BE49-F238E27FC236}">
+                <a16:creationId xmlns:a16="http://schemas.microsoft.com/office/drawing/2014/main" id="{D3DA7021-FEAD-4CB3-B73A-FC89C22A85E9}"/>
               </a:ext>
             </a:extLst>
           </p:cNvPr>
           <p:cNvPicPr>
-            <a:picLocks noChangeAspect="1" noChangeArrowheads="1"/>
+            <a:picLocks noChangeAspect="1"/>
           </p:cNvPicPr>
           <p:nvPr/>
         </p:nvPicPr>
@@ -5500,35 +5524,60 @@
               </a:ext>
             </a:extLst>
           </a:blip>
-          <a:srcRect/>
           <a:stretch>
             <a:fillRect/>
           </a:stretch>
         </p:blipFill>
-        <p:spPr bwMode="auto">
-          <a:xfrm>
-            <a:off x="2813539" y="1716001"/>
-            <a:ext cx="5786291" cy="4799128"/>
+        <p:spPr>
+          <a:xfrm>
+            <a:off x="1917270" y="1828800"/>
+            <a:ext cx="6874453" cy="4582968"/>
+          </a:xfrm>
+          <a:prstGeom prst="rect">
+            <a:avLst/>
+          </a:prstGeom>
+        </p:spPr>
+      </p:pic>
+      <p:sp>
+        <p:nvSpPr>
+          <p:cNvPr id="6" name="TextBox 5">
+            <a:extLst>
+              <a:ext uri="{FF2B5EF4-FFF2-40B4-BE49-F238E27FC236}">
+                <a16:creationId xmlns:a16="http://schemas.microsoft.com/office/drawing/2014/main" id="{BB1111A2-D7AE-4EF4-A151-BD5FAA6D343C}"/>
+              </a:ext>
+            </a:extLst>
+          </p:cNvPr>
+          <p:cNvSpPr txBox="1"/>
+          <p:nvPr/>
+        </p:nvSpPr>
+        <p:spPr>
+          <a:xfrm>
+            <a:off x="464235" y="406381"/>
+            <a:ext cx="11254154" cy="646331"/>
           </a:xfrm>
           <a:prstGeom prst="rect">
             <a:avLst/>
           </a:prstGeom>
           <a:noFill/>
-          <a:extLst>
-            <a:ext uri="{909E8E84-426E-40DD-AFC4-6F175D3DCCD1}">
-              <a14:hiddenFill xmlns:a14="http://schemas.microsoft.com/office/drawing/2010/main">
-                <a:solidFill>
-                  <a:srgbClr val="FFFFFF"/>
-                </a:solidFill>
-              </a14:hiddenFill>
-            </a:ext>
-          </a:extLst>
-        </p:spPr>
-      </p:pic>
+        </p:spPr>
+        <p:txBody>
+          <a:bodyPr wrap="square" rtlCol="0">
+            <a:spAutoFit/>
+          </a:bodyPr>
+          <a:lstStyle/>
+          <a:p>
+            <a:pPr algn="ctr"/>
+            <a:r>
+              <a:rPr lang="en-US" sz="3600" b="1" dirty="0"/>
+              <a:t>RESULTS:  RACE</a:t>
+            </a:r>
+          </a:p>
+        </p:txBody>
+      </p:sp>
     </p:spTree>
     <p:extLst>
       <p:ext uri="{BB962C8B-B14F-4D97-AF65-F5344CB8AC3E}">
-        <p14:creationId xmlns:p14="http://schemas.microsoft.com/office/powerpoint/2010/main" val="1552219319"/>
+        <p14:creationId xmlns:p14="http://schemas.microsoft.com/office/powerpoint/2010/main" val="2667430094"/>
       </p:ext>
     </p:extLst>
   </p:cSld>
@@ -5557,10 +5606,54 @@
       </p:grpSpPr>
       <p:sp>
         <p:nvSpPr>
-          <p:cNvPr id="5" name="TextBox 4">
-            <a:extLst>
-              <a:ext uri="{FF2B5EF4-FFF2-40B4-BE49-F238E27FC236}">
-                <a16:creationId xmlns:a16="http://schemas.microsoft.com/office/drawing/2014/main" id="{E211177D-66F8-45C3-BDF6-E849BD7A06E1}"/>
+          <p:cNvPr id="3" name="Content Placeholder 2">
+            <a:extLst>
+              <a:ext uri="{FF2B5EF4-FFF2-40B4-BE49-F238E27FC236}">
+                <a16:creationId xmlns:a16="http://schemas.microsoft.com/office/drawing/2014/main" id="{16A55A67-24DF-45F4-8C10-25F925D8C1A7}"/>
+              </a:ext>
+            </a:extLst>
+          </p:cNvPr>
+          <p:cNvSpPr>
+            <a:spLocks noGrp="1"/>
+          </p:cNvSpPr>
+          <p:nvPr>
+            <p:ph idx="1"/>
+          </p:nvPr>
+        </p:nvSpPr>
+        <p:spPr>
+          <a:xfrm>
+            <a:off x="412652" y="1045161"/>
+            <a:ext cx="11366696" cy="707886"/>
+          </a:xfrm>
+        </p:spPr>
+        <p:txBody>
+          <a:bodyPr>
+            <a:normAutofit/>
+          </a:bodyPr>
+          <a:lstStyle/>
+          <a:p>
+            <a:pPr marL="0" lvl="0" indent="0" algn="ctr">
+              <a:buNone/>
+            </a:pPr>
+            <a:r>
+              <a:rPr lang="en-US" sz="2400" dirty="0"/>
+              <a:t>Which entertainment subcategories have the highest consumer expenditures by region?</a:t>
+            </a:r>
+          </a:p>
+          <a:p>
+            <a:pPr marL="0" lvl="0" indent="0" algn="ctr">
+              <a:buNone/>
+            </a:pPr>
+            <a:endParaRPr lang="en-US" sz="2400" dirty="0"/>
+          </a:p>
+        </p:txBody>
+      </p:sp>
+      <p:sp>
+        <p:nvSpPr>
+          <p:cNvPr id="10" name="TextBox 9">
+            <a:extLst>
+              <a:ext uri="{FF2B5EF4-FFF2-40B4-BE49-F238E27FC236}">
+                <a16:creationId xmlns:a16="http://schemas.microsoft.com/office/drawing/2014/main" id="{21CE4D9E-2CD2-4E9B-AD7E-9F31344593C0}"/>
               </a:ext>
             </a:extLst>
           </p:cNvPr>
@@ -5569,7 +5662,7 @@
         </p:nvSpPr>
         <p:spPr>
           <a:xfrm>
-            <a:off x="464235" y="547283"/>
+            <a:off x="464235" y="406381"/>
             <a:ext cx="11254154" cy="646331"/>
           </a:xfrm>
           <a:prstGeom prst="rect">
@@ -5586,177 +5679,62 @@
             <a:pPr algn="ctr"/>
             <a:r>
               <a:rPr lang="en-US" sz="3600" b="1" dirty="0"/>
-              <a:t>CONCLUSIONS</a:t>
-            </a:r>
-          </a:p>
-        </p:txBody>
-      </p:sp>
-      <p:sp>
-        <p:nvSpPr>
-          <p:cNvPr id="6" name="TextBox 5">
-            <a:extLst>
-              <a:ext uri="{FF2B5EF4-FFF2-40B4-BE49-F238E27FC236}">
-                <a16:creationId xmlns:a16="http://schemas.microsoft.com/office/drawing/2014/main" id="{2A2189AA-49DD-4B79-964D-B8232E1E7530}"/>
-              </a:ext>
-            </a:extLst>
-          </p:cNvPr>
-          <p:cNvSpPr txBox="1"/>
+              <a:t>RESULTS:  REGION</a:t>
+            </a:r>
+          </a:p>
+        </p:txBody>
+      </p:sp>
+      <p:pic>
+        <p:nvPicPr>
+          <p:cNvPr id="2050" name="Picture 2">
+            <a:extLst>
+              <a:ext uri="{FF2B5EF4-FFF2-40B4-BE49-F238E27FC236}">
+                <a16:creationId xmlns:a16="http://schemas.microsoft.com/office/drawing/2014/main" id="{AFD57600-9DA7-4B53-9EE2-9E82E7396E70}"/>
+              </a:ext>
+            </a:extLst>
+          </p:cNvPr>
+          <p:cNvPicPr>
+            <a:picLocks noChangeAspect="1" noChangeArrowheads="1"/>
+          </p:cNvPicPr>
           <p:nvPr/>
-        </p:nvSpPr>
-        <p:spPr>
-          <a:xfrm>
-            <a:off x="371469" y="1193614"/>
-            <a:ext cx="11244778" cy="5201424"/>
+        </p:nvPicPr>
+        <p:blipFill>
+          <a:blip r:embed="rId2">
+            <a:extLst>
+              <a:ext uri="{28A0092B-C50C-407E-A947-70E740481C1C}">
+                <a14:useLocalDpi xmlns:a14="http://schemas.microsoft.com/office/drawing/2010/main" val="0"/>
+              </a:ext>
+            </a:extLst>
+          </a:blip>
+          <a:srcRect/>
+          <a:stretch>
+            <a:fillRect/>
+          </a:stretch>
+        </p:blipFill>
+        <p:spPr bwMode="auto">
+          <a:xfrm>
+            <a:off x="2475914" y="1981906"/>
+            <a:ext cx="7655170" cy="4469713"/>
           </a:xfrm>
           <a:prstGeom prst="rect">
             <a:avLst/>
           </a:prstGeom>
           <a:noFill/>
-        </p:spPr>
-        <p:txBody>
-          <a:bodyPr wrap="square" rtlCol="0">
-            <a:spAutoFit/>
-          </a:bodyPr>
-          <a:lstStyle/>
-          <a:p>
-            <a:pPr marL="285750" indent="-285750">
-              <a:spcBef>
-                <a:spcPts val="1200"/>
-              </a:spcBef>
-              <a:buFont typeface="Arial" panose="020B0604020202020204" pitchFamily="34" charset="0"/>
-              <a:buChar char="•"/>
-            </a:pPr>
-            <a:r>
-              <a:rPr lang="en-US" sz="2100" dirty="0"/>
-              <a:t>35 to 44 and 45 to 54 year olds both saw sharp increases in entertainment spending from 2016 to 2017</a:t>
-            </a:r>
-          </a:p>
-          <a:p>
-            <a:pPr marL="285750" indent="-285750">
-              <a:spcBef>
-                <a:spcPts val="1200"/>
-              </a:spcBef>
-              <a:buFont typeface="Arial" panose="020B0604020202020204" pitchFamily="34" charset="0"/>
-              <a:buChar char="•"/>
-            </a:pPr>
-            <a:r>
-              <a:rPr lang="en-US" sz="2100" dirty="0"/>
-              <a:t>Black/African American and Asians saw increases in entertainment spending from 2016-2017 while White remained relatively flat.</a:t>
-            </a:r>
-          </a:p>
-          <a:p>
-            <a:pPr marL="285750" indent="-285750">
-              <a:spcBef>
-                <a:spcPts val="1200"/>
-              </a:spcBef>
-              <a:buFont typeface="Arial" panose="020B0604020202020204" pitchFamily="34" charset="0"/>
-              <a:buChar char="•"/>
-            </a:pPr>
-            <a:r>
-              <a:rPr lang="en-US" sz="2100" dirty="0"/>
-              <a:t>All four geographical regions saw increases in entertainment spending from 2016-2017.</a:t>
-            </a:r>
-          </a:p>
-          <a:p>
-            <a:pPr marL="285750" indent="-285750">
-              <a:spcBef>
-                <a:spcPts val="1200"/>
-              </a:spcBef>
-              <a:buFont typeface="Arial" panose="020B0604020202020204" pitchFamily="34" charset="0"/>
-              <a:buChar char="•"/>
-            </a:pPr>
-            <a:r>
-              <a:rPr lang="en-US" sz="2100" dirty="0"/>
-              <a:t>35 to 44 and 45 to 54 year olds have near identical spending habits.</a:t>
-            </a:r>
-          </a:p>
-          <a:p>
-            <a:pPr marL="285750" indent="-285750">
-              <a:spcBef>
-                <a:spcPts val="1200"/>
-              </a:spcBef>
-              <a:buFont typeface="Arial" panose="020B0604020202020204" pitchFamily="34" charset="0"/>
-              <a:buChar char="•"/>
-            </a:pPr>
-            <a:r>
-              <a:rPr lang="en-US" sz="2100" dirty="0"/>
-              <a:t>65 to 74 year olds spend the most percent of their total expenditure on entertainment.</a:t>
-            </a:r>
-          </a:p>
-          <a:p>
-            <a:pPr marL="285750" indent="-285750">
-              <a:spcBef>
-                <a:spcPts val="1200"/>
-              </a:spcBef>
-              <a:buFont typeface="Arial" panose="020B0604020202020204" pitchFamily="34" charset="0"/>
-              <a:buChar char="•"/>
-            </a:pPr>
-            <a:r>
-              <a:rPr lang="en-US" sz="2100" dirty="0"/>
-              <a:t>Asians spent the largest percent of their entertainment expenditures on fees and admissions.</a:t>
-            </a:r>
-          </a:p>
-          <a:p>
-            <a:pPr marL="285750" indent="-285750">
-              <a:spcBef>
-                <a:spcPts val="1200"/>
-              </a:spcBef>
-              <a:buFont typeface="Arial" panose="020B0604020202020204" pitchFamily="34" charset="0"/>
-              <a:buChar char="•"/>
-            </a:pPr>
-            <a:r>
-              <a:rPr lang="en-US" sz="2100" dirty="0"/>
-              <a:t>White people spent the highest percentage of total expenditures on entertainment.</a:t>
-            </a:r>
-          </a:p>
-          <a:p>
-            <a:pPr marL="285750" indent="-285750">
-              <a:spcBef>
-                <a:spcPts val="1200"/>
-              </a:spcBef>
-              <a:buFont typeface="Arial" panose="020B0604020202020204" pitchFamily="34" charset="0"/>
-              <a:buChar char="•"/>
-            </a:pPr>
-            <a:r>
-              <a:rPr lang="en-US" sz="2100" dirty="0"/>
-              <a:t>The West Region spent the most money on Entertainment.</a:t>
-            </a:r>
-          </a:p>
-          <a:p>
-            <a:pPr marL="285750" indent="-285750">
-              <a:spcBef>
-                <a:spcPts val="1200"/>
-              </a:spcBef>
-              <a:buFont typeface="Arial" panose="020B0604020202020204" pitchFamily="34" charset="0"/>
-              <a:buChar char="•"/>
-            </a:pPr>
-            <a:r>
-              <a:rPr lang="en-US" sz="2100" dirty="0"/>
-              <a:t>The Midwest Region spent </a:t>
-            </a:r>
-            <a:r>
-              <a:rPr lang="en-US" sz="2100"/>
-              <a:t>the largest </a:t>
-            </a:r>
-            <a:r>
-              <a:rPr lang="en-US" sz="2100" dirty="0"/>
-              <a:t>amount of their total </a:t>
-            </a:r>
-            <a:r>
-              <a:rPr lang="en-US" sz="2100"/>
-              <a:t>expenditures on                 </a:t>
-            </a:r>
-            <a:r>
-              <a:rPr lang="en-US" sz="2100" dirty="0"/>
-              <a:t>on Entertainment.</a:t>
-            </a:r>
-          </a:p>
-        </p:txBody>
-      </p:sp>
+          <a:extLst>
+            <a:ext uri="{909E8E84-426E-40DD-AFC4-6F175D3DCCD1}">
+              <a14:hiddenFill xmlns:a14="http://schemas.microsoft.com/office/drawing/2010/main">
+                <a:solidFill>
+                  <a:srgbClr val="FFFFFF"/>
+                </a:solidFill>
+              </a14:hiddenFill>
+            </a:ext>
+          </a:extLst>
+        </p:spPr>
+      </p:pic>
     </p:spTree>
     <p:extLst>
       <p:ext uri="{BB962C8B-B14F-4D97-AF65-F5344CB8AC3E}">
-        <p14:creationId xmlns:p14="http://schemas.microsoft.com/office/powerpoint/2010/main" val="958017574"/>
+        <p14:creationId xmlns:p14="http://schemas.microsoft.com/office/powerpoint/2010/main" val="2506859037"/>
       </p:ext>
     </p:extLst>
   </p:cSld>
@@ -5785,10 +5763,54 @@
       </p:grpSpPr>
       <p:sp>
         <p:nvSpPr>
-          <p:cNvPr id="5" name="TextBox 4">
-            <a:extLst>
-              <a:ext uri="{FF2B5EF4-FFF2-40B4-BE49-F238E27FC236}">
-                <a16:creationId xmlns:a16="http://schemas.microsoft.com/office/drawing/2014/main" id="{D8A5332B-C797-48FE-AA7D-060728DEC654}"/>
+          <p:cNvPr id="3" name="Content Placeholder 2">
+            <a:extLst>
+              <a:ext uri="{FF2B5EF4-FFF2-40B4-BE49-F238E27FC236}">
+                <a16:creationId xmlns:a16="http://schemas.microsoft.com/office/drawing/2014/main" id="{16A55A67-24DF-45F4-8C10-25F925D8C1A7}"/>
+              </a:ext>
+            </a:extLst>
+          </p:cNvPr>
+          <p:cNvSpPr>
+            <a:spLocks noGrp="1"/>
+          </p:cNvSpPr>
+          <p:nvPr>
+            <p:ph idx="1"/>
+          </p:nvPr>
+        </p:nvSpPr>
+        <p:spPr>
+          <a:xfrm>
+            <a:off x="407964" y="1176905"/>
+            <a:ext cx="11366696" cy="707886"/>
+          </a:xfrm>
+        </p:spPr>
+        <p:txBody>
+          <a:bodyPr>
+            <a:normAutofit/>
+          </a:bodyPr>
+          <a:lstStyle/>
+          <a:p>
+            <a:pPr marL="0" lvl="0" indent="0" algn="ctr">
+              <a:buNone/>
+            </a:pPr>
+            <a:r>
+              <a:rPr lang="en-US" sz="2400" dirty="0"/>
+              <a:t>Which entertainment region has the highest consumer expenditure for entertainment?</a:t>
+            </a:r>
+          </a:p>
+          <a:p>
+            <a:pPr marL="0" lvl="0" indent="0" algn="ctr">
+              <a:buNone/>
+            </a:pPr>
+            <a:endParaRPr lang="en-US" sz="2400" dirty="0"/>
+          </a:p>
+        </p:txBody>
+      </p:sp>
+      <p:sp>
+        <p:nvSpPr>
+          <p:cNvPr id="10" name="TextBox 9">
+            <a:extLst>
+              <a:ext uri="{FF2B5EF4-FFF2-40B4-BE49-F238E27FC236}">
+                <a16:creationId xmlns:a16="http://schemas.microsoft.com/office/drawing/2014/main" id="{21CE4D9E-2CD2-4E9B-AD7E-9F31344593C0}"/>
               </a:ext>
             </a:extLst>
           </p:cNvPr>
@@ -5814,58 +5836,62 @@
             <a:pPr algn="ctr"/>
             <a:r>
               <a:rPr lang="en-US" sz="3600" b="1" dirty="0"/>
-              <a:t>AREAS FOR FURTHER STUDY</a:t>
-            </a:r>
-          </a:p>
-        </p:txBody>
-      </p:sp>
-      <p:sp>
-        <p:nvSpPr>
-          <p:cNvPr id="2" name="Rectangle 1">
-            <a:extLst>
-              <a:ext uri="{FF2B5EF4-FFF2-40B4-BE49-F238E27FC236}">
-                <a16:creationId xmlns:a16="http://schemas.microsoft.com/office/drawing/2014/main" id="{3B69075F-88F4-4348-A31C-AC7F911C57C4}"/>
-              </a:ext>
-            </a:extLst>
-          </p:cNvPr>
-          <p:cNvSpPr/>
+              <a:t>RESULTS:  REGION</a:t>
+            </a:r>
+          </a:p>
+        </p:txBody>
+      </p:sp>
+      <p:pic>
+        <p:nvPicPr>
+          <p:cNvPr id="3074" name="Picture 2">
+            <a:extLst>
+              <a:ext uri="{FF2B5EF4-FFF2-40B4-BE49-F238E27FC236}">
+                <a16:creationId xmlns:a16="http://schemas.microsoft.com/office/drawing/2014/main" id="{1706A220-8CAE-436F-8489-CD3EE7C1A702}"/>
+              </a:ext>
+            </a:extLst>
+          </p:cNvPr>
+          <p:cNvPicPr>
+            <a:picLocks noChangeAspect="1" noChangeArrowheads="1"/>
+          </p:cNvPicPr>
           <p:nvPr/>
-        </p:nvSpPr>
-        <p:spPr>
-          <a:xfrm>
-            <a:off x="914400" y="1364974"/>
-            <a:ext cx="9488557" cy="1938992"/>
+        </p:nvPicPr>
+        <p:blipFill>
+          <a:blip r:embed="rId2">
+            <a:extLst>
+              <a:ext uri="{28A0092B-C50C-407E-A947-70E740481C1C}">
+                <a14:useLocalDpi xmlns:a14="http://schemas.microsoft.com/office/drawing/2010/main" val="0"/>
+              </a:ext>
+            </a:extLst>
+          </a:blip>
+          <a:srcRect/>
+          <a:stretch>
+            <a:fillRect/>
+          </a:stretch>
+        </p:blipFill>
+        <p:spPr bwMode="auto">
+          <a:xfrm>
+            <a:off x="2618221" y="2008985"/>
+            <a:ext cx="6119446" cy="4314553"/>
           </a:xfrm>
           <a:prstGeom prst="rect">
             <a:avLst/>
           </a:prstGeom>
-        </p:spPr>
-        <p:txBody>
-          <a:bodyPr wrap="square">
-            <a:spAutoFit/>
-          </a:bodyPr>
-          <a:lstStyle/>
-          <a:p>
-            <a:r>
-              <a:rPr lang="en-US" sz="2400" dirty="0"/>
-              <a:t>How does the US entertainment industry compares to the worldwide entertainment industry when looking at demographics? </a:t>
-            </a:r>
-          </a:p>
-          <a:p>
-            <a:endParaRPr lang="en-US" sz="2400" dirty="0"/>
-          </a:p>
-          <a:p>
-            <a:endParaRPr lang="en-US" sz="2400" dirty="0"/>
-          </a:p>
-          <a:p>
-            <a:endParaRPr lang="en-US" sz="2400" dirty="0"/>
-          </a:p>
-        </p:txBody>
-      </p:sp>
+          <a:noFill/>
+          <a:extLst>
+            <a:ext uri="{909E8E84-426E-40DD-AFC4-6F175D3DCCD1}">
+              <a14:hiddenFill xmlns:a14="http://schemas.microsoft.com/office/drawing/2010/main">
+                <a:solidFill>
+                  <a:srgbClr val="FFFFFF"/>
+                </a:solidFill>
+              </a14:hiddenFill>
+            </a:ext>
+          </a:extLst>
+        </p:spPr>
+      </p:pic>
     </p:spTree>
     <p:extLst>
       <p:ext uri="{BB962C8B-B14F-4D97-AF65-F5344CB8AC3E}">
-        <p14:creationId xmlns:p14="http://schemas.microsoft.com/office/powerpoint/2010/main" val="3164850464"/>
+        <p14:creationId xmlns:p14="http://schemas.microsoft.com/office/powerpoint/2010/main" val="2564147352"/>
       </p:ext>
     </p:extLst>
   </p:cSld>
@@ -6122,6 +6148,489 @@
 </p:sld>
 </file>
 
+<file path=ppt/slides/slide20.xml><?xml version="1.0" encoding="utf-8"?>
+<p:sld xmlns:a="http://schemas.openxmlformats.org/drawingml/2006/main" xmlns:r="http://schemas.openxmlformats.org/officeDocument/2006/relationships" xmlns:p="http://schemas.openxmlformats.org/presentationml/2006/main">
+  <p:cSld>
+    <p:spTree>
+      <p:nvGrpSpPr>
+        <p:cNvPr id="1" name=""/>
+        <p:cNvGrpSpPr/>
+        <p:nvPr/>
+      </p:nvGrpSpPr>
+      <p:grpSpPr>
+        <a:xfrm>
+          <a:off x="0" y="0"/>
+          <a:ext cx="0" cy="0"/>
+          <a:chOff x="0" y="0"/>
+          <a:chExt cx="0" cy="0"/>
+        </a:xfrm>
+      </p:grpSpPr>
+      <p:sp>
+        <p:nvSpPr>
+          <p:cNvPr id="3" name="Content Placeholder 2">
+            <a:extLst>
+              <a:ext uri="{FF2B5EF4-FFF2-40B4-BE49-F238E27FC236}">
+                <a16:creationId xmlns:a16="http://schemas.microsoft.com/office/drawing/2014/main" id="{16A55A67-24DF-45F4-8C10-25F925D8C1A7}"/>
+              </a:ext>
+            </a:extLst>
+          </p:cNvPr>
+          <p:cNvSpPr>
+            <a:spLocks noGrp="1"/>
+          </p:cNvSpPr>
+          <p:nvPr>
+            <p:ph idx="1"/>
+          </p:nvPr>
+        </p:nvSpPr>
+        <p:spPr>
+          <a:xfrm>
+            <a:off x="464235" y="1061191"/>
+            <a:ext cx="11254154" cy="646331"/>
+          </a:xfrm>
+        </p:spPr>
+        <p:txBody>
+          <a:bodyPr>
+            <a:normAutofit fontScale="92500"/>
+          </a:bodyPr>
+          <a:lstStyle/>
+          <a:p>
+            <a:pPr marL="0" lvl="0" indent="0" algn="ctr">
+              <a:buNone/>
+            </a:pPr>
+            <a:r>
+              <a:rPr lang="en-US" dirty="0"/>
+              <a:t>What is </a:t>
+            </a:r>
+            <a:r>
+              <a:rPr lang="en-US" sz="2400" dirty="0"/>
+              <a:t>the</a:t>
+            </a:r>
+            <a:r>
+              <a:rPr lang="en-US" dirty="0"/>
+              <a:t> % of average total expenditure spent on entertainment by region? </a:t>
+            </a:r>
+          </a:p>
+        </p:txBody>
+      </p:sp>
+      <p:sp>
+        <p:nvSpPr>
+          <p:cNvPr id="5" name="TextBox 4">
+            <a:extLst>
+              <a:ext uri="{FF2B5EF4-FFF2-40B4-BE49-F238E27FC236}">
+                <a16:creationId xmlns:a16="http://schemas.microsoft.com/office/drawing/2014/main" id="{1597666D-83CD-4CB9-A2E8-F7A70ABBFC6C}"/>
+              </a:ext>
+            </a:extLst>
+          </p:cNvPr>
+          <p:cNvSpPr txBox="1"/>
+          <p:nvPr/>
+        </p:nvSpPr>
+        <p:spPr>
+          <a:xfrm>
+            <a:off x="464235" y="406381"/>
+            <a:ext cx="11254154" cy="646331"/>
+          </a:xfrm>
+          <a:prstGeom prst="rect">
+            <a:avLst/>
+          </a:prstGeom>
+          <a:noFill/>
+        </p:spPr>
+        <p:txBody>
+          <a:bodyPr wrap="square" rtlCol="0">
+            <a:spAutoFit/>
+          </a:bodyPr>
+          <a:lstStyle/>
+          <a:p>
+            <a:pPr algn="ctr"/>
+            <a:r>
+              <a:rPr lang="en-US" sz="3600" b="1" dirty="0"/>
+              <a:t>RESULTS:  REGION</a:t>
+            </a:r>
+          </a:p>
+        </p:txBody>
+      </p:sp>
+      <p:pic>
+        <p:nvPicPr>
+          <p:cNvPr id="4098" name="Picture 2">
+            <a:extLst>
+              <a:ext uri="{FF2B5EF4-FFF2-40B4-BE49-F238E27FC236}">
+                <a16:creationId xmlns:a16="http://schemas.microsoft.com/office/drawing/2014/main" id="{22F86C44-A419-423A-8D1A-9528C94219D3}"/>
+              </a:ext>
+            </a:extLst>
+          </p:cNvPr>
+          <p:cNvPicPr>
+            <a:picLocks noChangeAspect="1" noChangeArrowheads="1"/>
+          </p:cNvPicPr>
+          <p:nvPr/>
+        </p:nvPicPr>
+        <p:blipFill>
+          <a:blip r:embed="rId2">
+            <a:extLst>
+              <a:ext uri="{28A0092B-C50C-407E-A947-70E740481C1C}">
+                <a14:useLocalDpi xmlns:a14="http://schemas.microsoft.com/office/drawing/2010/main" val="0"/>
+              </a:ext>
+            </a:extLst>
+          </a:blip>
+          <a:srcRect/>
+          <a:stretch>
+            <a:fillRect/>
+          </a:stretch>
+        </p:blipFill>
+        <p:spPr bwMode="auto">
+          <a:xfrm>
+            <a:off x="2813539" y="1716001"/>
+            <a:ext cx="5786291" cy="4799128"/>
+          </a:xfrm>
+          <a:prstGeom prst="rect">
+            <a:avLst/>
+          </a:prstGeom>
+          <a:noFill/>
+          <a:extLst>
+            <a:ext uri="{909E8E84-426E-40DD-AFC4-6F175D3DCCD1}">
+              <a14:hiddenFill xmlns:a14="http://schemas.microsoft.com/office/drawing/2010/main">
+                <a:solidFill>
+                  <a:srgbClr val="FFFFFF"/>
+                </a:solidFill>
+              </a14:hiddenFill>
+            </a:ext>
+          </a:extLst>
+        </p:spPr>
+      </p:pic>
+    </p:spTree>
+    <p:extLst>
+      <p:ext uri="{BB962C8B-B14F-4D97-AF65-F5344CB8AC3E}">
+        <p14:creationId xmlns:p14="http://schemas.microsoft.com/office/powerpoint/2010/main" val="1552219319"/>
+      </p:ext>
+    </p:extLst>
+  </p:cSld>
+  <p:clrMapOvr>
+    <a:masterClrMapping/>
+  </p:clrMapOvr>
+</p:sld>
+</file>
+
+<file path=ppt/slides/slide21.xml><?xml version="1.0" encoding="utf-8"?>
+<p:sld xmlns:a="http://schemas.openxmlformats.org/drawingml/2006/main" xmlns:r="http://schemas.openxmlformats.org/officeDocument/2006/relationships" xmlns:p="http://schemas.openxmlformats.org/presentationml/2006/main">
+  <p:cSld>
+    <p:spTree>
+      <p:nvGrpSpPr>
+        <p:cNvPr id="1" name=""/>
+        <p:cNvGrpSpPr/>
+        <p:nvPr/>
+      </p:nvGrpSpPr>
+      <p:grpSpPr>
+        <a:xfrm>
+          <a:off x="0" y="0"/>
+          <a:ext cx="0" cy="0"/>
+          <a:chOff x="0" y="0"/>
+          <a:chExt cx="0" cy="0"/>
+        </a:xfrm>
+      </p:grpSpPr>
+      <p:sp>
+        <p:nvSpPr>
+          <p:cNvPr id="5" name="TextBox 4">
+            <a:extLst>
+              <a:ext uri="{FF2B5EF4-FFF2-40B4-BE49-F238E27FC236}">
+                <a16:creationId xmlns:a16="http://schemas.microsoft.com/office/drawing/2014/main" id="{E211177D-66F8-45C3-BDF6-E849BD7A06E1}"/>
+              </a:ext>
+            </a:extLst>
+          </p:cNvPr>
+          <p:cNvSpPr txBox="1"/>
+          <p:nvPr/>
+        </p:nvSpPr>
+        <p:spPr>
+          <a:xfrm>
+            <a:off x="464235" y="547283"/>
+            <a:ext cx="11254154" cy="646331"/>
+          </a:xfrm>
+          <a:prstGeom prst="rect">
+            <a:avLst/>
+          </a:prstGeom>
+          <a:noFill/>
+        </p:spPr>
+        <p:txBody>
+          <a:bodyPr wrap="square" rtlCol="0">
+            <a:spAutoFit/>
+          </a:bodyPr>
+          <a:lstStyle/>
+          <a:p>
+            <a:pPr algn="ctr"/>
+            <a:r>
+              <a:rPr lang="en-US" sz="3600" b="1" dirty="0"/>
+              <a:t>CONCLUSIONS</a:t>
+            </a:r>
+          </a:p>
+        </p:txBody>
+      </p:sp>
+      <p:sp>
+        <p:nvSpPr>
+          <p:cNvPr id="6" name="TextBox 5">
+            <a:extLst>
+              <a:ext uri="{FF2B5EF4-FFF2-40B4-BE49-F238E27FC236}">
+                <a16:creationId xmlns:a16="http://schemas.microsoft.com/office/drawing/2014/main" id="{2A2189AA-49DD-4B79-964D-B8232E1E7530}"/>
+              </a:ext>
+            </a:extLst>
+          </p:cNvPr>
+          <p:cNvSpPr txBox="1"/>
+          <p:nvPr/>
+        </p:nvSpPr>
+        <p:spPr>
+          <a:xfrm>
+            <a:off x="371469" y="1193614"/>
+            <a:ext cx="11244778" cy="5201424"/>
+          </a:xfrm>
+          <a:prstGeom prst="rect">
+            <a:avLst/>
+          </a:prstGeom>
+          <a:noFill/>
+        </p:spPr>
+        <p:txBody>
+          <a:bodyPr wrap="square" rtlCol="0">
+            <a:spAutoFit/>
+          </a:bodyPr>
+          <a:lstStyle/>
+          <a:p>
+            <a:pPr marL="285750" indent="-285750">
+              <a:spcBef>
+                <a:spcPts val="1200"/>
+              </a:spcBef>
+              <a:buFont typeface="Arial" panose="020B0604020202020204" pitchFamily="34" charset="0"/>
+              <a:buChar char="•"/>
+            </a:pPr>
+            <a:r>
+              <a:rPr lang="en-US" sz="2100" dirty="0"/>
+              <a:t>35 to 44 and 45 to 54 year olds both saw sharp increases in entertainment spending from 2016 to 2017</a:t>
+            </a:r>
+          </a:p>
+          <a:p>
+            <a:pPr marL="285750" indent="-285750">
+              <a:spcBef>
+                <a:spcPts val="1200"/>
+              </a:spcBef>
+              <a:buFont typeface="Arial" panose="020B0604020202020204" pitchFamily="34" charset="0"/>
+              <a:buChar char="•"/>
+            </a:pPr>
+            <a:r>
+              <a:rPr lang="en-US" sz="2100" dirty="0"/>
+              <a:t>Black/African American and Asians saw increases in entertainment spending from 2016-2017 while White remained relatively flat.</a:t>
+            </a:r>
+          </a:p>
+          <a:p>
+            <a:pPr marL="285750" indent="-285750">
+              <a:spcBef>
+                <a:spcPts val="1200"/>
+              </a:spcBef>
+              <a:buFont typeface="Arial" panose="020B0604020202020204" pitchFamily="34" charset="0"/>
+              <a:buChar char="•"/>
+            </a:pPr>
+            <a:r>
+              <a:rPr lang="en-US" sz="2100" dirty="0"/>
+              <a:t>All four geographical regions saw increases in entertainment spending from 2016-2017.</a:t>
+            </a:r>
+          </a:p>
+          <a:p>
+            <a:pPr marL="285750" indent="-285750">
+              <a:spcBef>
+                <a:spcPts val="1200"/>
+              </a:spcBef>
+              <a:buFont typeface="Arial" panose="020B0604020202020204" pitchFamily="34" charset="0"/>
+              <a:buChar char="•"/>
+            </a:pPr>
+            <a:r>
+              <a:rPr lang="en-US" sz="2100" dirty="0"/>
+              <a:t>35 to 44 and 45 to 54 year olds have near identical spending habits.</a:t>
+            </a:r>
+          </a:p>
+          <a:p>
+            <a:pPr marL="285750" indent="-285750">
+              <a:spcBef>
+                <a:spcPts val="1200"/>
+              </a:spcBef>
+              <a:buFont typeface="Arial" panose="020B0604020202020204" pitchFamily="34" charset="0"/>
+              <a:buChar char="•"/>
+            </a:pPr>
+            <a:r>
+              <a:rPr lang="en-US" sz="2100" dirty="0"/>
+              <a:t>65 to 74 year olds spend the most percent of their total expenditure on entertainment.</a:t>
+            </a:r>
+          </a:p>
+          <a:p>
+            <a:pPr marL="285750" indent="-285750">
+              <a:spcBef>
+                <a:spcPts val="1200"/>
+              </a:spcBef>
+              <a:buFont typeface="Arial" panose="020B0604020202020204" pitchFamily="34" charset="0"/>
+              <a:buChar char="•"/>
+            </a:pPr>
+            <a:r>
+              <a:rPr lang="en-US" sz="2100" dirty="0"/>
+              <a:t>Asians spent the largest percent of their entertainment expenditures on fees and admissions.</a:t>
+            </a:r>
+          </a:p>
+          <a:p>
+            <a:pPr marL="285750" indent="-285750">
+              <a:spcBef>
+                <a:spcPts val="1200"/>
+              </a:spcBef>
+              <a:buFont typeface="Arial" panose="020B0604020202020204" pitchFamily="34" charset="0"/>
+              <a:buChar char="•"/>
+            </a:pPr>
+            <a:r>
+              <a:rPr lang="en-US" sz="2100" dirty="0"/>
+              <a:t>White people spent the highest percentage of total expenditures on entertainment.</a:t>
+            </a:r>
+          </a:p>
+          <a:p>
+            <a:pPr marL="285750" indent="-285750">
+              <a:spcBef>
+                <a:spcPts val="1200"/>
+              </a:spcBef>
+              <a:buFont typeface="Arial" panose="020B0604020202020204" pitchFamily="34" charset="0"/>
+              <a:buChar char="•"/>
+            </a:pPr>
+            <a:r>
+              <a:rPr lang="en-US" sz="2100" dirty="0"/>
+              <a:t>The West Region spent the most money on Entertainment.</a:t>
+            </a:r>
+          </a:p>
+          <a:p>
+            <a:pPr marL="285750" indent="-285750">
+              <a:spcBef>
+                <a:spcPts val="1200"/>
+              </a:spcBef>
+              <a:buFont typeface="Arial" panose="020B0604020202020204" pitchFamily="34" charset="0"/>
+              <a:buChar char="•"/>
+            </a:pPr>
+            <a:r>
+              <a:rPr lang="en-US" sz="2100" dirty="0"/>
+              <a:t>The Midwest Region spent the largest amount of their total expenditures on                 on Entertainment.</a:t>
+            </a:r>
+          </a:p>
+        </p:txBody>
+      </p:sp>
+    </p:spTree>
+    <p:extLst>
+      <p:ext uri="{BB962C8B-B14F-4D97-AF65-F5344CB8AC3E}">
+        <p14:creationId xmlns:p14="http://schemas.microsoft.com/office/powerpoint/2010/main" val="958017574"/>
+      </p:ext>
+    </p:extLst>
+  </p:cSld>
+  <p:clrMapOvr>
+    <a:masterClrMapping/>
+  </p:clrMapOvr>
+</p:sld>
+</file>
+
+<file path=ppt/slides/slide22.xml><?xml version="1.0" encoding="utf-8"?>
+<p:sld xmlns:a="http://schemas.openxmlformats.org/drawingml/2006/main" xmlns:r="http://schemas.openxmlformats.org/officeDocument/2006/relationships" xmlns:p="http://schemas.openxmlformats.org/presentationml/2006/main">
+  <p:cSld>
+    <p:spTree>
+      <p:nvGrpSpPr>
+        <p:cNvPr id="1" name=""/>
+        <p:cNvGrpSpPr/>
+        <p:nvPr/>
+      </p:nvGrpSpPr>
+      <p:grpSpPr>
+        <a:xfrm>
+          <a:off x="0" y="0"/>
+          <a:ext cx="0" cy="0"/>
+          <a:chOff x="0" y="0"/>
+          <a:chExt cx="0" cy="0"/>
+        </a:xfrm>
+      </p:grpSpPr>
+      <p:sp>
+        <p:nvSpPr>
+          <p:cNvPr id="5" name="TextBox 4">
+            <a:extLst>
+              <a:ext uri="{FF2B5EF4-FFF2-40B4-BE49-F238E27FC236}">
+                <a16:creationId xmlns:a16="http://schemas.microsoft.com/office/drawing/2014/main" id="{D8A5332B-C797-48FE-AA7D-060728DEC654}"/>
+              </a:ext>
+            </a:extLst>
+          </p:cNvPr>
+          <p:cNvSpPr txBox="1"/>
+          <p:nvPr/>
+        </p:nvSpPr>
+        <p:spPr>
+          <a:xfrm>
+            <a:off x="464235" y="406381"/>
+            <a:ext cx="11254154" cy="646331"/>
+          </a:xfrm>
+          <a:prstGeom prst="rect">
+            <a:avLst/>
+          </a:prstGeom>
+          <a:noFill/>
+        </p:spPr>
+        <p:txBody>
+          <a:bodyPr wrap="square" rtlCol="0">
+            <a:spAutoFit/>
+          </a:bodyPr>
+          <a:lstStyle/>
+          <a:p>
+            <a:pPr algn="ctr"/>
+            <a:r>
+              <a:rPr lang="en-US" sz="3600" b="1" dirty="0"/>
+              <a:t>AREAS FOR FURTHER STUDY</a:t>
+            </a:r>
+          </a:p>
+        </p:txBody>
+      </p:sp>
+      <p:sp>
+        <p:nvSpPr>
+          <p:cNvPr id="2" name="Rectangle 1">
+            <a:extLst>
+              <a:ext uri="{FF2B5EF4-FFF2-40B4-BE49-F238E27FC236}">
+                <a16:creationId xmlns:a16="http://schemas.microsoft.com/office/drawing/2014/main" id="{3B69075F-88F4-4348-A31C-AC7F911C57C4}"/>
+              </a:ext>
+            </a:extLst>
+          </p:cNvPr>
+          <p:cNvSpPr/>
+          <p:nvPr/>
+        </p:nvSpPr>
+        <p:spPr>
+          <a:xfrm>
+            <a:off x="914400" y="1364974"/>
+            <a:ext cx="9488557" cy="2308324"/>
+          </a:xfrm>
+          <a:prstGeom prst="rect">
+            <a:avLst/>
+          </a:prstGeom>
+        </p:spPr>
+        <p:txBody>
+          <a:bodyPr wrap="square">
+            <a:spAutoFit/>
+          </a:bodyPr>
+          <a:lstStyle/>
+          <a:p>
+            <a:r>
+              <a:rPr lang="en-US" sz="2400" dirty="0"/>
+              <a:t>How does the US entertainment industry compares to the worldwide entertainment industry when looking at demographics? </a:t>
+            </a:r>
+          </a:p>
+          <a:p>
+            <a:endParaRPr lang="en-US" sz="2400" dirty="0"/>
+          </a:p>
+          <a:p>
+            <a:endParaRPr lang="en-US" sz="2400" dirty="0"/>
+          </a:p>
+          <a:p>
+            <a:endParaRPr lang="en-US" sz="2400" dirty="0"/>
+          </a:p>
+          <a:p>
+            <a:endParaRPr lang="en-US" sz="2400" dirty="0"/>
+          </a:p>
+        </p:txBody>
+      </p:sp>
+    </p:spTree>
+    <p:extLst>
+      <p:ext uri="{BB962C8B-B14F-4D97-AF65-F5344CB8AC3E}">
+        <p14:creationId xmlns:p14="http://schemas.microsoft.com/office/powerpoint/2010/main" val="3164850464"/>
+      </p:ext>
+    </p:extLst>
+  </p:cSld>
+  <p:clrMapOvr>
+    <a:masterClrMapping/>
+  </p:clrMapOvr>
+</p:sld>
+</file>
+
 <file path=ppt/slides/slide3.xml><?xml version="1.0" encoding="utf-8"?>
 <p:sld xmlns:a="http://schemas.openxmlformats.org/drawingml/2006/main" xmlns:r="http://schemas.openxmlformats.org/officeDocument/2006/relationships" xmlns:p="http://schemas.openxmlformats.org/presentationml/2006/main">
   <p:cSld>
@@ -6141,101 +6650,166 @@
       </p:grpSpPr>
       <p:sp>
         <p:nvSpPr>
-          <p:cNvPr id="2" name="Title 1">
-            <a:extLst>
-              <a:ext uri="{FF2B5EF4-FFF2-40B4-BE49-F238E27FC236}">
-                <a16:creationId xmlns:a16="http://schemas.microsoft.com/office/drawing/2014/main" id="{BA1A19D9-21CB-4860-BF98-0C895AF16BD7}"/>
-              </a:ext>
-            </a:extLst>
-          </p:cNvPr>
-          <p:cNvSpPr>
-            <a:spLocks noGrp="1"/>
-          </p:cNvSpPr>
-          <p:nvPr>
-            <p:ph type="title"/>
-          </p:nvPr>
-        </p:nvSpPr>
-        <p:spPr/>
-        <p:txBody>
-          <a:bodyPr/>
-          <a:lstStyle/>
-          <a:p>
-            <a:r>
-              <a:rPr lang="en-US" dirty="0"/>
-              <a:t>Data Exploration</a:t>
-            </a:r>
-            <a:br>
-              <a:rPr lang="en-US" dirty="0"/>
-            </a:br>
-            <a:endParaRPr lang="en-US" dirty="0"/>
-          </a:p>
-        </p:txBody>
-      </p:sp>
-      <p:pic>
-        <p:nvPicPr>
-          <p:cNvPr id="4" name="Content Placeholder 3">
-            <a:extLst>
-              <a:ext uri="{FF2B5EF4-FFF2-40B4-BE49-F238E27FC236}">
-                <a16:creationId xmlns:a16="http://schemas.microsoft.com/office/drawing/2014/main" id="{289DCE1C-0583-485E-B281-27D614F14CAB}"/>
-              </a:ext>
-            </a:extLst>
-          </p:cNvPr>
-          <p:cNvPicPr>
-            <a:picLocks noGrp="1" noChangeAspect="1"/>
-          </p:cNvPicPr>
-          <p:nvPr>
-            <p:ph idx="1"/>
-          </p:nvPr>
-        </p:nvPicPr>
-        <p:blipFill>
-          <a:blip r:embed="rId2"/>
-          <a:stretch>
-            <a:fillRect/>
-          </a:stretch>
-        </p:blipFill>
-        <p:spPr>
-          <a:xfrm>
-            <a:off x="838200" y="1027906"/>
-            <a:ext cx="5967953" cy="5283412"/>
+          <p:cNvPr id="4" name="TextBox 3">
+            <a:extLst>
+              <a:ext uri="{FF2B5EF4-FFF2-40B4-BE49-F238E27FC236}">
+                <a16:creationId xmlns:a16="http://schemas.microsoft.com/office/drawing/2014/main" id="{DDE8B1DA-6F55-45EE-BC5B-717EA3185E0C}"/>
+              </a:ext>
+            </a:extLst>
+          </p:cNvPr>
+          <p:cNvSpPr txBox="1"/>
+          <p:nvPr/>
+        </p:nvSpPr>
+        <p:spPr>
+          <a:xfrm>
+            <a:off x="475957" y="408208"/>
+            <a:ext cx="11240086" cy="646331"/>
           </a:xfrm>
           <a:prstGeom prst="rect">
             <a:avLst/>
           </a:prstGeom>
-        </p:spPr>
-      </p:pic>
-      <p:pic>
-        <p:nvPicPr>
-          <p:cNvPr id="5" name="Picture 4">
-            <a:extLst>
-              <a:ext uri="{FF2B5EF4-FFF2-40B4-BE49-F238E27FC236}">
-                <a16:creationId xmlns:a16="http://schemas.microsoft.com/office/drawing/2014/main" id="{75D49C51-1DD9-41D2-9C77-ED61A47BEFB8}"/>
-              </a:ext>
-            </a:extLst>
-          </p:cNvPr>
-          <p:cNvPicPr>
-            <a:picLocks noChangeAspect="1"/>
-          </p:cNvPicPr>
+          <a:noFill/>
+        </p:spPr>
+        <p:txBody>
+          <a:bodyPr wrap="square" rtlCol="0">
+            <a:spAutoFit/>
+          </a:bodyPr>
+          <a:lstStyle/>
+          <a:p>
+            <a:pPr algn="ctr"/>
+            <a:r>
+              <a:rPr lang="en-US" sz="3600" b="1" dirty="0"/>
+              <a:t>RESEARCH QUESTIONS</a:t>
+            </a:r>
+          </a:p>
+        </p:txBody>
+      </p:sp>
+      <p:sp>
+        <p:nvSpPr>
+          <p:cNvPr id="7" name="TextBox 6">
+            <a:extLst>
+              <a:ext uri="{FF2B5EF4-FFF2-40B4-BE49-F238E27FC236}">
+                <a16:creationId xmlns:a16="http://schemas.microsoft.com/office/drawing/2014/main" id="{91BCA410-6FFD-4400-9951-F381C5B9FA70}"/>
+              </a:ext>
+            </a:extLst>
+          </p:cNvPr>
+          <p:cNvSpPr txBox="1"/>
           <p:nvPr/>
-        </p:nvPicPr>
-        <p:blipFill rotWithShape="1">
-          <a:blip r:embed="rId3"/>
-          <a:srcRect r="44657"/>
-          <a:stretch/>
-        </p:blipFill>
-        <p:spPr>
-          <a:xfrm>
-            <a:off x="5599522" y="1236881"/>
-            <a:ext cx="5109592" cy="5174078"/>
+        </p:nvSpPr>
+        <p:spPr>
+          <a:xfrm>
+            <a:off x="1195754" y="1054539"/>
+            <a:ext cx="10255347" cy="5170646"/>
           </a:xfrm>
           <a:prstGeom prst="rect">
             <a:avLst/>
           </a:prstGeom>
-        </p:spPr>
-      </p:pic>
+          <a:noFill/>
+        </p:spPr>
+        <p:txBody>
+          <a:bodyPr wrap="square" rtlCol="0">
+            <a:spAutoFit/>
+          </a:bodyPr>
+          <a:lstStyle/>
+          <a:p>
+            <a:pPr lvl="0"/>
+            <a:r>
+              <a:rPr lang="en-US" sz="2200" dirty="0"/>
+              <a:t>What are the trends from 2013-2017 for the overall entertainment category in total consumer expenditure?</a:t>
+            </a:r>
+          </a:p>
+          <a:p>
+            <a:pPr lvl="1"/>
+            <a:r>
+              <a:rPr lang="en-US" sz="2200" dirty="0"/>
+              <a:t>By age</a:t>
+            </a:r>
+          </a:p>
+          <a:p>
+            <a:pPr lvl="1"/>
+            <a:r>
+              <a:rPr lang="en-US" sz="2200" dirty="0"/>
+              <a:t>By race</a:t>
+            </a:r>
+          </a:p>
+          <a:p>
+            <a:pPr lvl="1"/>
+            <a:r>
+              <a:rPr lang="en-US" sz="2200" dirty="0"/>
+              <a:t>By region</a:t>
+            </a:r>
+          </a:p>
+          <a:p>
+            <a:endParaRPr lang="en-US" sz="2200" dirty="0"/>
+          </a:p>
+          <a:p>
+            <a:pPr lvl="0"/>
+            <a:r>
+              <a:rPr lang="en-US" sz="2200" dirty="0"/>
+              <a:t>Which entertainment subcategories have the highest consumer expenditure?</a:t>
+            </a:r>
+          </a:p>
+          <a:p>
+            <a:pPr lvl="1"/>
+            <a:r>
+              <a:rPr lang="en-US" sz="2200" dirty="0"/>
+              <a:t>By age</a:t>
+            </a:r>
+          </a:p>
+          <a:p>
+            <a:pPr lvl="1"/>
+            <a:r>
+              <a:rPr lang="en-US" sz="2200" dirty="0"/>
+              <a:t>By race</a:t>
+            </a:r>
+          </a:p>
+          <a:p>
+            <a:pPr lvl="1"/>
+            <a:r>
+              <a:rPr lang="en-US" sz="2200" dirty="0"/>
+              <a:t>By region</a:t>
+            </a:r>
+          </a:p>
+          <a:p>
+            <a:r>
+              <a:rPr lang="en-US" sz="2200" dirty="0"/>
+              <a:t> </a:t>
+            </a:r>
+          </a:p>
+          <a:p>
+            <a:pPr lvl="0"/>
+            <a:r>
+              <a:rPr lang="en-US" sz="2200" dirty="0"/>
+              <a:t>What is the % of average total expenditure spent on entertainment? </a:t>
+            </a:r>
+          </a:p>
+          <a:p>
+            <a:pPr lvl="1"/>
+            <a:r>
+              <a:rPr lang="en-US" sz="2200" dirty="0"/>
+              <a:t>By age</a:t>
+            </a:r>
+          </a:p>
+          <a:p>
+            <a:pPr lvl="1"/>
+            <a:r>
+              <a:rPr lang="en-US" sz="2200" dirty="0"/>
+              <a:t>By race</a:t>
+            </a:r>
+          </a:p>
+          <a:p>
+            <a:pPr lvl="1"/>
+            <a:r>
+              <a:rPr lang="en-US" sz="2200" dirty="0"/>
+              <a:t>By region</a:t>
+            </a:r>
+          </a:p>
+        </p:txBody>
+      </p:sp>
     </p:spTree>
     <p:extLst>
       <p:ext uri="{BB962C8B-B14F-4D97-AF65-F5344CB8AC3E}">
-        <p14:creationId xmlns:p14="http://schemas.microsoft.com/office/powerpoint/2010/main" val="726630338"/>
+        <p14:creationId xmlns:p14="http://schemas.microsoft.com/office/powerpoint/2010/main" val="2675704250"/>
       </p:ext>
     </p:extLst>
   </p:cSld>
@@ -6267,7 +6841,7 @@
           <p:cNvPr id="2" name="Title 1">
             <a:extLst>
               <a:ext uri="{FF2B5EF4-FFF2-40B4-BE49-F238E27FC236}">
-                <a16:creationId xmlns:a16="http://schemas.microsoft.com/office/drawing/2014/main" id="{9654698D-0FD9-47A0-9E92-74FC891793BC}"/>
+                <a16:creationId xmlns:a16="http://schemas.microsoft.com/office/drawing/2014/main" id="{BA1A19D9-21CB-4860-BF98-0C895AF16BD7}"/>
               </a:ext>
             </a:extLst>
           </p:cNvPr>
@@ -6285,17 +6859,21 @@
           <a:p>
             <a:r>
               <a:rPr lang="en-US" dirty="0"/>
-              <a:t>Data Exploration (Cont.)</a:t>
-            </a:r>
+              <a:t>Data Exploration</a:t>
+            </a:r>
+            <a:br>
+              <a:rPr lang="en-US" dirty="0"/>
+            </a:br>
+            <a:endParaRPr lang="en-US" dirty="0"/>
           </a:p>
         </p:txBody>
       </p:sp>
       <p:pic>
         <p:nvPicPr>
-          <p:cNvPr id="5" name="Content Placeholder 4">
-            <a:extLst>
-              <a:ext uri="{FF2B5EF4-FFF2-40B4-BE49-F238E27FC236}">
-                <a16:creationId xmlns:a16="http://schemas.microsoft.com/office/drawing/2014/main" id="{8DAD576B-2AED-4B07-A622-179F577E6860}"/>
+          <p:cNvPr id="4" name="Content Placeholder 3">
+            <a:extLst>
+              <a:ext uri="{FF2B5EF4-FFF2-40B4-BE49-F238E27FC236}">
+                <a16:creationId xmlns:a16="http://schemas.microsoft.com/office/drawing/2014/main" id="{289DCE1C-0583-485E-B281-27D614F14CAB}"/>
               </a:ext>
             </a:extLst>
           </p:cNvPr>
@@ -6307,30 +6885,27 @@
           </p:nvPr>
         </p:nvPicPr>
         <p:blipFill>
-          <a:blip r:embed="rId2">
-            <a:extLst>
-              <a:ext uri="{28A0092B-C50C-407E-A947-70E740481C1C}">
-                <a14:useLocalDpi xmlns:a14="http://schemas.microsoft.com/office/drawing/2010/main" val="0"/>
-              </a:ext>
-            </a:extLst>
-          </a:blip>
+          <a:blip r:embed="rId2"/>
           <a:stretch>
             <a:fillRect/>
           </a:stretch>
         </p:blipFill>
         <p:spPr>
           <a:xfrm>
-            <a:off x="969013" y="1391992"/>
-            <a:ext cx="5780579" cy="4906050"/>
-          </a:xfrm>
+            <a:off x="838200" y="1027906"/>
+            <a:ext cx="5967953" cy="5283412"/>
+          </a:xfrm>
+          <a:prstGeom prst="rect">
+            <a:avLst/>
+          </a:prstGeom>
         </p:spPr>
       </p:pic>
       <p:pic>
         <p:nvPicPr>
-          <p:cNvPr id="7" name="Picture 6">
-            <a:extLst>
-              <a:ext uri="{FF2B5EF4-FFF2-40B4-BE49-F238E27FC236}">
-                <a16:creationId xmlns:a16="http://schemas.microsoft.com/office/drawing/2014/main" id="{DEF73446-555B-47D5-8679-D772500C808D}"/>
+          <p:cNvPr id="5" name="Picture 4">
+            <a:extLst>
+              <a:ext uri="{FF2B5EF4-FFF2-40B4-BE49-F238E27FC236}">
+                <a16:creationId xmlns:a16="http://schemas.microsoft.com/office/drawing/2014/main" id="{75D49C51-1DD9-41D2-9C77-ED61A47BEFB8}"/>
               </a:ext>
             </a:extLst>
           </p:cNvPr>
@@ -6339,22 +6914,15 @@
           </p:cNvPicPr>
           <p:nvPr/>
         </p:nvPicPr>
-        <p:blipFill>
-          <a:blip r:embed="rId3">
-            <a:extLst>
-              <a:ext uri="{28A0092B-C50C-407E-A947-70E740481C1C}">
-                <a14:useLocalDpi xmlns:a14="http://schemas.microsoft.com/office/drawing/2010/main" val="0"/>
-              </a:ext>
-            </a:extLst>
-          </a:blip>
-          <a:stretch>
-            <a:fillRect/>
-          </a:stretch>
+        <p:blipFill rotWithShape="1">
+          <a:blip r:embed="rId3"/>
+          <a:srcRect r="44657"/>
+          <a:stretch/>
         </p:blipFill>
         <p:spPr>
           <a:xfrm>
-            <a:off x="6096000" y="2188917"/>
-            <a:ext cx="5537485" cy="4229317"/>
+            <a:off x="5599522" y="1236881"/>
+            <a:ext cx="5109592" cy="5174078"/>
           </a:xfrm>
           <a:prstGeom prst="rect">
             <a:avLst/>
@@ -6364,7 +6932,7 @@
     </p:spTree>
     <p:extLst>
       <p:ext uri="{BB962C8B-B14F-4D97-AF65-F5344CB8AC3E}">
-        <p14:creationId xmlns:p14="http://schemas.microsoft.com/office/powerpoint/2010/main" val="2407271663"/>
+        <p14:creationId xmlns:p14="http://schemas.microsoft.com/office/powerpoint/2010/main" val="726630338"/>
       </p:ext>
     </p:extLst>
   </p:cSld>
@@ -6396,7 +6964,7 @@
           <p:cNvPr id="2" name="Title 1">
             <a:extLst>
               <a:ext uri="{FF2B5EF4-FFF2-40B4-BE49-F238E27FC236}">
-                <a16:creationId xmlns:a16="http://schemas.microsoft.com/office/drawing/2014/main" id="{08BBFAD4-B566-4B55-A714-CB1D40A48C9E}"/>
+                <a16:creationId xmlns:a16="http://schemas.microsoft.com/office/drawing/2014/main" id="{9654698D-0FD9-47A0-9E92-74FC891793BC}"/>
               </a:ext>
             </a:extLst>
           </p:cNvPr>
@@ -6421,10 +6989,10 @@
       </p:sp>
       <p:pic>
         <p:nvPicPr>
-          <p:cNvPr id="4" name="Content Placeholder 3">
-            <a:extLst>
-              <a:ext uri="{FF2B5EF4-FFF2-40B4-BE49-F238E27FC236}">
-                <a16:creationId xmlns:a16="http://schemas.microsoft.com/office/drawing/2014/main" id="{201A93CC-7420-420E-AD06-52F6BC9EF24C}"/>
+          <p:cNvPr id="5" name="Content Placeholder 4">
+            <a:extLst>
+              <a:ext uri="{FF2B5EF4-FFF2-40B4-BE49-F238E27FC236}">
+                <a16:creationId xmlns:a16="http://schemas.microsoft.com/office/drawing/2014/main" id="{8DAD576B-2AED-4B07-A622-179F577E6860}"/>
               </a:ext>
             </a:extLst>
           </p:cNvPr>
@@ -6436,15 +7004,54 @@
           </p:nvPr>
         </p:nvPicPr>
         <p:blipFill>
-          <a:blip r:embed="rId2"/>
+          <a:blip r:embed="rId2">
+            <a:extLst>
+              <a:ext uri="{28A0092B-C50C-407E-A947-70E740481C1C}">
+                <a14:useLocalDpi xmlns:a14="http://schemas.microsoft.com/office/drawing/2010/main" val="0"/>
+              </a:ext>
+            </a:extLst>
+          </a:blip>
           <a:stretch>
             <a:fillRect/>
           </a:stretch>
         </p:blipFill>
         <p:spPr>
           <a:xfrm>
-            <a:off x="838200" y="1390642"/>
-            <a:ext cx="8475482" cy="4076715"/>
+            <a:off x="969013" y="1391992"/>
+            <a:ext cx="5997395" cy="5090064"/>
+          </a:xfrm>
+        </p:spPr>
+      </p:pic>
+      <p:pic>
+        <p:nvPicPr>
+          <p:cNvPr id="7" name="Picture 6">
+            <a:extLst>
+              <a:ext uri="{FF2B5EF4-FFF2-40B4-BE49-F238E27FC236}">
+                <a16:creationId xmlns:a16="http://schemas.microsoft.com/office/drawing/2014/main" id="{DEF73446-555B-47D5-8679-D772500C808D}"/>
+              </a:ext>
+            </a:extLst>
+          </p:cNvPr>
+          <p:cNvPicPr>
+            <a:picLocks noChangeAspect="1"/>
+          </p:cNvPicPr>
+          <p:nvPr/>
+        </p:nvPicPr>
+        <p:blipFill>
+          <a:blip r:embed="rId3">
+            <a:extLst>
+              <a:ext uri="{28A0092B-C50C-407E-A947-70E740481C1C}">
+                <a14:useLocalDpi xmlns:a14="http://schemas.microsoft.com/office/drawing/2010/main" val="0"/>
+              </a:ext>
+            </a:extLst>
+          </a:blip>
+          <a:stretch>
+            <a:fillRect/>
+          </a:stretch>
+        </p:blipFill>
+        <p:spPr>
+          <a:xfrm>
+            <a:off x="5921997" y="2055043"/>
+            <a:ext cx="5796330" cy="4427013"/>
           </a:xfrm>
           <a:prstGeom prst="rect">
             <a:avLst/>
@@ -6454,7 +7061,7 @@
     </p:spTree>
     <p:extLst>
       <p:ext uri="{BB962C8B-B14F-4D97-AF65-F5344CB8AC3E}">
-        <p14:creationId xmlns:p14="http://schemas.microsoft.com/office/powerpoint/2010/main" val="2558935564"/>
+        <p14:creationId xmlns:p14="http://schemas.microsoft.com/office/powerpoint/2010/main" val="2407271663"/>
       </p:ext>
     </p:extLst>
   </p:cSld>
@@ -6483,166 +7090,68 @@
       </p:grpSpPr>
       <p:sp>
         <p:nvSpPr>
-          <p:cNvPr id="4" name="TextBox 3">
-            <a:extLst>
-              <a:ext uri="{FF2B5EF4-FFF2-40B4-BE49-F238E27FC236}">
-                <a16:creationId xmlns:a16="http://schemas.microsoft.com/office/drawing/2014/main" id="{DDE8B1DA-6F55-45EE-BC5B-717EA3185E0C}"/>
-              </a:ext>
-            </a:extLst>
-          </p:cNvPr>
-          <p:cNvSpPr txBox="1"/>
-          <p:nvPr/>
-        </p:nvSpPr>
-        <p:spPr>
-          <a:xfrm>
-            <a:off x="475957" y="408208"/>
-            <a:ext cx="11240086" cy="646331"/>
+          <p:cNvPr id="2" name="Title 1">
+            <a:extLst>
+              <a:ext uri="{FF2B5EF4-FFF2-40B4-BE49-F238E27FC236}">
+                <a16:creationId xmlns:a16="http://schemas.microsoft.com/office/drawing/2014/main" id="{08BBFAD4-B566-4B55-A714-CB1D40A48C9E}"/>
+              </a:ext>
+            </a:extLst>
+          </p:cNvPr>
+          <p:cNvSpPr>
+            <a:spLocks noGrp="1"/>
+          </p:cNvSpPr>
+          <p:nvPr>
+            <p:ph type="title"/>
+          </p:nvPr>
+        </p:nvSpPr>
+        <p:spPr/>
+        <p:txBody>
+          <a:bodyPr/>
+          <a:lstStyle/>
+          <a:p>
+            <a:r>
+              <a:rPr lang="en-US" dirty="0"/>
+              <a:t>Data Exploration (Cont.)</a:t>
+            </a:r>
+          </a:p>
+        </p:txBody>
+      </p:sp>
+      <p:pic>
+        <p:nvPicPr>
+          <p:cNvPr id="4" name="Content Placeholder 3">
+            <a:extLst>
+              <a:ext uri="{FF2B5EF4-FFF2-40B4-BE49-F238E27FC236}">
+                <a16:creationId xmlns:a16="http://schemas.microsoft.com/office/drawing/2014/main" id="{201A93CC-7420-420E-AD06-52F6BC9EF24C}"/>
+              </a:ext>
+            </a:extLst>
+          </p:cNvPr>
+          <p:cNvPicPr>
+            <a:picLocks noGrp="1" noChangeAspect="1"/>
+          </p:cNvPicPr>
+          <p:nvPr>
+            <p:ph idx="1"/>
+          </p:nvPr>
+        </p:nvPicPr>
+        <p:blipFill>
+          <a:blip r:embed="rId2"/>
+          <a:stretch>
+            <a:fillRect/>
+          </a:stretch>
+        </p:blipFill>
+        <p:spPr>
+          <a:xfrm>
+            <a:off x="838200" y="1390642"/>
+            <a:ext cx="8475482" cy="4076715"/>
           </a:xfrm>
           <a:prstGeom prst="rect">
             <a:avLst/>
           </a:prstGeom>
-          <a:noFill/>
-        </p:spPr>
-        <p:txBody>
-          <a:bodyPr wrap="square" rtlCol="0">
-            <a:spAutoFit/>
-          </a:bodyPr>
-          <a:lstStyle/>
-          <a:p>
-            <a:pPr algn="ctr"/>
-            <a:r>
-              <a:rPr lang="en-US" sz="3600" b="1" dirty="0"/>
-              <a:t>RESEARCH QUESTIONS</a:t>
-            </a:r>
-          </a:p>
-        </p:txBody>
-      </p:sp>
-      <p:sp>
-        <p:nvSpPr>
-          <p:cNvPr id="7" name="TextBox 6">
-            <a:extLst>
-              <a:ext uri="{FF2B5EF4-FFF2-40B4-BE49-F238E27FC236}">
-                <a16:creationId xmlns:a16="http://schemas.microsoft.com/office/drawing/2014/main" id="{91BCA410-6FFD-4400-9951-F381C5B9FA70}"/>
-              </a:ext>
-            </a:extLst>
-          </p:cNvPr>
-          <p:cNvSpPr txBox="1"/>
-          <p:nvPr/>
-        </p:nvSpPr>
-        <p:spPr>
-          <a:xfrm>
-            <a:off x="1195754" y="1054539"/>
-            <a:ext cx="10255347" cy="5170646"/>
-          </a:xfrm>
-          <a:prstGeom prst="rect">
-            <a:avLst/>
-          </a:prstGeom>
-          <a:noFill/>
-        </p:spPr>
-        <p:txBody>
-          <a:bodyPr wrap="square" rtlCol="0">
-            <a:spAutoFit/>
-          </a:bodyPr>
-          <a:lstStyle/>
-          <a:p>
-            <a:pPr lvl="0"/>
-            <a:r>
-              <a:rPr lang="en-US" sz="2200" dirty="0"/>
-              <a:t>What are the trends from 2013-2017 for the overall entertainment category in total consumer expenditure?</a:t>
-            </a:r>
-          </a:p>
-          <a:p>
-            <a:pPr lvl="1"/>
-            <a:r>
-              <a:rPr lang="en-US" sz="2200" dirty="0"/>
-              <a:t>By age</a:t>
-            </a:r>
-          </a:p>
-          <a:p>
-            <a:pPr lvl="1"/>
-            <a:r>
-              <a:rPr lang="en-US" sz="2200" dirty="0"/>
-              <a:t>By race</a:t>
-            </a:r>
-          </a:p>
-          <a:p>
-            <a:pPr lvl="1"/>
-            <a:r>
-              <a:rPr lang="en-US" sz="2200" dirty="0"/>
-              <a:t>By region</a:t>
-            </a:r>
-          </a:p>
-          <a:p>
-            <a:endParaRPr lang="en-US" sz="2200" dirty="0"/>
-          </a:p>
-          <a:p>
-            <a:pPr lvl="0"/>
-            <a:r>
-              <a:rPr lang="en-US" sz="2200" dirty="0"/>
-              <a:t>Which entertainment subcategories have the highest consumer expenditure?</a:t>
-            </a:r>
-          </a:p>
-          <a:p>
-            <a:pPr lvl="1"/>
-            <a:r>
-              <a:rPr lang="en-US" sz="2200" dirty="0"/>
-              <a:t>By age</a:t>
-            </a:r>
-          </a:p>
-          <a:p>
-            <a:pPr lvl="1"/>
-            <a:r>
-              <a:rPr lang="en-US" sz="2200" dirty="0"/>
-              <a:t>By race</a:t>
-            </a:r>
-          </a:p>
-          <a:p>
-            <a:pPr lvl="1"/>
-            <a:r>
-              <a:rPr lang="en-US" sz="2200" dirty="0"/>
-              <a:t>By region</a:t>
-            </a:r>
-          </a:p>
-          <a:p>
-            <a:r>
-              <a:rPr lang="en-US" sz="2200" dirty="0"/>
-              <a:t> </a:t>
-            </a:r>
-          </a:p>
-          <a:p>
-            <a:pPr lvl="0"/>
-            <a:r>
-              <a:rPr lang="en-US" sz="2200" dirty="0"/>
-              <a:t>What is the % of average total expenditure spent on entertainment? </a:t>
-            </a:r>
-          </a:p>
-          <a:p>
-            <a:pPr lvl="1"/>
-            <a:r>
-              <a:rPr lang="en-US" sz="2200" dirty="0"/>
-              <a:t>By age</a:t>
-            </a:r>
-          </a:p>
-          <a:p>
-            <a:pPr lvl="1"/>
-            <a:r>
-              <a:rPr lang="en-US" sz="2200" dirty="0"/>
-              <a:t>By race</a:t>
-            </a:r>
-          </a:p>
-          <a:p>
-            <a:pPr lvl="1"/>
-            <a:r>
-              <a:rPr lang="en-US" sz="2200" dirty="0"/>
-              <a:t>By region</a:t>
-            </a:r>
-          </a:p>
-        </p:txBody>
-      </p:sp>
+        </p:spPr>
+      </p:pic>
     </p:spTree>
     <p:extLst>
       <p:ext uri="{BB962C8B-B14F-4D97-AF65-F5344CB8AC3E}">
-        <p14:creationId xmlns:p14="http://schemas.microsoft.com/office/powerpoint/2010/main" val="2675704250"/>
+        <p14:creationId xmlns:p14="http://schemas.microsoft.com/office/powerpoint/2010/main" val="2558935564"/>
       </p:ext>
     </p:extLst>
   </p:cSld>
@@ -6885,10 +7394,119 @@
       </p:grpSpPr>
       <p:pic>
         <p:nvPicPr>
-          <p:cNvPr id="3" name="Picture 2">
-            <a:extLst>
-              <a:ext uri="{FF2B5EF4-FFF2-40B4-BE49-F238E27FC236}">
-                <a16:creationId xmlns:a16="http://schemas.microsoft.com/office/drawing/2014/main" id="{21F3E6D6-A0A0-4381-9F73-7BDA923ED30F}"/>
+          <p:cNvPr id="10" name="Picture 9">
+            <a:extLst>
+              <a:ext uri="{FF2B5EF4-FFF2-40B4-BE49-F238E27FC236}">
+                <a16:creationId xmlns:a16="http://schemas.microsoft.com/office/drawing/2014/main" id="{54E8AF83-8B12-40F0-97A1-1007F75C5E88}"/>
+              </a:ext>
+            </a:extLst>
+          </p:cNvPr>
+          <p:cNvPicPr>
+            <a:picLocks noChangeAspect="1"/>
+          </p:cNvPicPr>
+          <p:nvPr/>
+        </p:nvPicPr>
+        <p:blipFill>
+          <a:blip r:embed="rId2"/>
+          <a:stretch>
+            <a:fillRect/>
+          </a:stretch>
+        </p:blipFill>
+        <p:spPr>
+          <a:xfrm>
+            <a:off x="914400" y="944619"/>
+            <a:ext cx="7170754" cy="5615539"/>
+          </a:xfrm>
+          <a:prstGeom prst="rect">
+            <a:avLst/>
+          </a:prstGeom>
+        </p:spPr>
+      </p:pic>
+      <p:sp>
+        <p:nvSpPr>
+          <p:cNvPr id="4" name="TextBox 3">
+            <a:extLst>
+              <a:ext uri="{FF2B5EF4-FFF2-40B4-BE49-F238E27FC236}">
+                <a16:creationId xmlns:a16="http://schemas.microsoft.com/office/drawing/2014/main" id="{CE618F46-5EAB-48AB-A271-31AE58894292}"/>
+              </a:ext>
+            </a:extLst>
+          </p:cNvPr>
+          <p:cNvSpPr txBox="1"/>
+          <p:nvPr/>
+        </p:nvSpPr>
+        <p:spPr>
+          <a:xfrm>
+            <a:off x="464235" y="406381"/>
+            <a:ext cx="11254154" cy="646331"/>
+          </a:xfrm>
+          <a:prstGeom prst="rect">
+            <a:avLst/>
+          </a:prstGeom>
+          <a:noFill/>
+        </p:spPr>
+        <p:txBody>
+          <a:bodyPr wrap="square" rtlCol="0">
+            <a:spAutoFit/>
+          </a:bodyPr>
+          <a:lstStyle/>
+          <a:p>
+            <a:pPr algn="ctr"/>
+            <a:r>
+              <a:rPr lang="en-US" sz="3600" b="1" dirty="0"/>
+              <a:t>RESULTS:  TRENDS BY AGE (Comparison)</a:t>
+            </a:r>
+          </a:p>
+        </p:txBody>
+      </p:sp>
+      <p:sp>
+        <p:nvSpPr>
+          <p:cNvPr id="5" name="TextBox 4">
+            <a:extLst>
+              <a:ext uri="{FF2B5EF4-FFF2-40B4-BE49-F238E27FC236}">
+                <a16:creationId xmlns:a16="http://schemas.microsoft.com/office/drawing/2014/main" id="{ACF4CA0C-77E4-4A5A-8A69-9987311CA65B}"/>
+              </a:ext>
+            </a:extLst>
+          </p:cNvPr>
+          <p:cNvSpPr txBox="1"/>
+          <p:nvPr/>
+        </p:nvSpPr>
+        <p:spPr>
+          <a:xfrm>
+            <a:off x="2299252" y="1866619"/>
+            <a:ext cx="7898295" cy="646331"/>
+          </a:xfrm>
+          <a:prstGeom prst="rect">
+            <a:avLst/>
+          </a:prstGeom>
+          <a:noFill/>
+        </p:spPr>
+        <p:txBody>
+          <a:bodyPr wrap="square" rtlCol="0">
+            <a:spAutoFit/>
+          </a:bodyPr>
+          <a:lstStyle/>
+          <a:p>
+            <a:pPr marL="285750" indent="-285750">
+              <a:buFont typeface="Arial" panose="020B0604020202020204" pitchFamily="34" charset="0"/>
+              <a:buChar char="•"/>
+            </a:pPr>
+            <a:endParaRPr lang="en-US" dirty="0"/>
+          </a:p>
+          <a:p>
+            <a:pPr marL="285750" indent="-285750">
+              <a:buFont typeface="Arial" panose="020B0604020202020204" pitchFamily="34" charset="0"/>
+              <a:buChar char="•"/>
+            </a:pPr>
+            <a:endParaRPr lang="en-US" dirty="0"/>
+          </a:p>
+        </p:txBody>
+      </p:sp>
+      <p:pic>
+        <p:nvPicPr>
+          <p:cNvPr id="8" name="Picture 7">
+            <a:extLst>
+              <a:ext uri="{FF2B5EF4-FFF2-40B4-BE49-F238E27FC236}">
+                <a16:creationId xmlns:a16="http://schemas.microsoft.com/office/drawing/2014/main" id="{5DF48F15-4463-4C61-8F05-3C51DDE2D101}"/>
               </a:ext>
             </a:extLst>
           </p:cNvPr>
@@ -6898,179 +7516,30 @@
           <p:nvPr/>
         </p:nvPicPr>
         <p:blipFill rotWithShape="1">
-          <a:blip r:embed="rId2">
+          <a:blip r:embed="rId3">
             <a:extLst>
               <a:ext uri="{28A0092B-C50C-407E-A947-70E740481C1C}">
                 <a14:useLocalDpi xmlns:a14="http://schemas.microsoft.com/office/drawing/2010/main" val="0"/>
               </a:ext>
             </a:extLst>
           </a:blip>
-          <a:srcRect r="25655"/>
+          <a:srcRect l="75042" b="52504"/>
           <a:stretch/>
         </p:blipFill>
         <p:spPr>
           <a:xfrm>
-            <a:off x="2299252" y="2114370"/>
-            <a:ext cx="5768571" cy="4320585"/>
+            <a:off x="8283172" y="1230759"/>
+            <a:ext cx="2341997" cy="2521630"/>
           </a:xfrm>
           <a:prstGeom prst="rect">
             <a:avLst/>
           </a:prstGeom>
         </p:spPr>
       </p:pic>
-      <p:sp>
-        <p:nvSpPr>
-          <p:cNvPr id="5" name="TextBox 4">
-            <a:extLst>
-              <a:ext uri="{FF2B5EF4-FFF2-40B4-BE49-F238E27FC236}">
-                <a16:creationId xmlns:a16="http://schemas.microsoft.com/office/drawing/2014/main" id="{ACF4CA0C-77E4-4A5A-8A69-9987311CA65B}"/>
-              </a:ext>
-            </a:extLst>
-          </p:cNvPr>
-          <p:cNvSpPr txBox="1"/>
-          <p:nvPr/>
-        </p:nvSpPr>
-        <p:spPr>
-          <a:xfrm>
-            <a:off x="2299252" y="1791205"/>
-            <a:ext cx="7898295" cy="646331"/>
-          </a:xfrm>
-          <a:prstGeom prst="rect">
-            <a:avLst/>
-          </a:prstGeom>
-          <a:noFill/>
-        </p:spPr>
-        <p:txBody>
-          <a:bodyPr wrap="square" rtlCol="0">
-            <a:spAutoFit/>
-          </a:bodyPr>
-          <a:lstStyle/>
-          <a:p>
-            <a:pPr marL="285750" indent="-285750">
-              <a:buFont typeface="Arial" panose="020B0604020202020204" pitchFamily="34" charset="0"/>
-              <a:buChar char="•"/>
-            </a:pPr>
-            <a:endParaRPr lang="en-US" dirty="0"/>
-          </a:p>
-          <a:p>
-            <a:pPr marL="285750" indent="-285750">
-              <a:buFont typeface="Arial" panose="020B0604020202020204" pitchFamily="34" charset="0"/>
-              <a:buChar char="•"/>
-            </a:pPr>
-            <a:endParaRPr lang="en-US" dirty="0"/>
-          </a:p>
-        </p:txBody>
-      </p:sp>
-      <p:sp>
-        <p:nvSpPr>
-          <p:cNvPr id="6" name="Rectangle 5">
-            <a:extLst>
-              <a:ext uri="{FF2B5EF4-FFF2-40B4-BE49-F238E27FC236}">
-                <a16:creationId xmlns:a16="http://schemas.microsoft.com/office/drawing/2014/main" id="{92CC0FFC-9FF3-48BF-905A-87822B7B6042}"/>
-              </a:ext>
-            </a:extLst>
-          </p:cNvPr>
-          <p:cNvSpPr/>
-          <p:nvPr/>
-        </p:nvSpPr>
-        <p:spPr>
-          <a:xfrm>
-            <a:off x="443949" y="982009"/>
-            <a:ext cx="11326020" cy="830997"/>
-          </a:xfrm>
-          <a:prstGeom prst="rect">
-            <a:avLst/>
-          </a:prstGeom>
-        </p:spPr>
-        <p:txBody>
-          <a:bodyPr wrap="square">
-            <a:spAutoFit/>
-          </a:bodyPr>
-          <a:lstStyle/>
-          <a:p>
-            <a:pPr lvl="0" algn="ctr"/>
-            <a:r>
-              <a:rPr lang="en-US" sz="2400" dirty="0"/>
-              <a:t>What are the trends from 2013-2017 for the overall entertainment category in total consumer expenditure?</a:t>
-            </a:r>
-          </a:p>
-        </p:txBody>
-      </p:sp>
-      <p:pic>
-        <p:nvPicPr>
-          <p:cNvPr id="7" name="Picture 6">
-            <a:extLst>
-              <a:ext uri="{FF2B5EF4-FFF2-40B4-BE49-F238E27FC236}">
-                <a16:creationId xmlns:a16="http://schemas.microsoft.com/office/drawing/2014/main" id="{81E95F85-8614-4334-B985-1AEB60E197AC}"/>
-              </a:ext>
-            </a:extLst>
-          </p:cNvPr>
-          <p:cNvPicPr>
-            <a:picLocks noChangeAspect="1"/>
-          </p:cNvPicPr>
-          <p:nvPr/>
-        </p:nvPicPr>
-        <p:blipFill rotWithShape="1">
-          <a:blip r:embed="rId2">
-            <a:extLst>
-              <a:ext uri="{28A0092B-C50C-407E-A947-70E740481C1C}">
-                <a14:useLocalDpi xmlns:a14="http://schemas.microsoft.com/office/drawing/2010/main" val="0"/>
-              </a:ext>
-            </a:extLst>
-          </a:blip>
-          <a:srcRect l="74326" b="69573"/>
-          <a:stretch/>
-        </p:blipFill>
-        <p:spPr>
-          <a:xfrm>
-            <a:off x="8625426" y="2209474"/>
-            <a:ext cx="2534643" cy="1672660"/>
-          </a:xfrm>
-          <a:prstGeom prst="rect">
-            <a:avLst/>
-          </a:prstGeom>
-        </p:spPr>
-      </p:pic>
-      <p:sp>
-        <p:nvSpPr>
-          <p:cNvPr id="8" name="TextBox 7">
-            <a:extLst>
-              <a:ext uri="{FF2B5EF4-FFF2-40B4-BE49-F238E27FC236}">
-                <a16:creationId xmlns:a16="http://schemas.microsoft.com/office/drawing/2014/main" id="{E5DF6A43-E5E1-4751-9EDB-7C861F97C777}"/>
-              </a:ext>
-            </a:extLst>
-          </p:cNvPr>
-          <p:cNvSpPr txBox="1"/>
-          <p:nvPr/>
-        </p:nvSpPr>
-        <p:spPr>
-          <a:xfrm>
-            <a:off x="464235" y="406381"/>
-            <a:ext cx="11254154" cy="646331"/>
-          </a:xfrm>
-          <a:prstGeom prst="rect">
-            <a:avLst/>
-          </a:prstGeom>
-          <a:noFill/>
-        </p:spPr>
-        <p:txBody>
-          <a:bodyPr wrap="square" rtlCol="0">
-            <a:spAutoFit/>
-          </a:bodyPr>
-          <a:lstStyle/>
-          <a:p>
-            <a:pPr algn="ctr"/>
-            <a:r>
-              <a:rPr lang="en-US" sz="3600" b="1" dirty="0"/>
-              <a:t>RESULTS:  TRENDS BY RACE</a:t>
-            </a:r>
-          </a:p>
-        </p:txBody>
-      </p:sp>
     </p:spTree>
     <p:extLst>
       <p:ext uri="{BB962C8B-B14F-4D97-AF65-F5344CB8AC3E}">
-        <p14:creationId xmlns:p14="http://schemas.microsoft.com/office/powerpoint/2010/main" val="1365939811"/>
+        <p14:creationId xmlns:p14="http://schemas.microsoft.com/office/powerpoint/2010/main" val="4135854843"/>
       </p:ext>
     </p:extLst>
   </p:cSld>
@@ -7097,90 +7566,12 @@
           <a:chExt cx="0" cy="0"/>
         </a:xfrm>
       </p:grpSpPr>
-      <p:sp>
-        <p:nvSpPr>
-          <p:cNvPr id="5" name="TextBox 4">
-            <a:extLst>
-              <a:ext uri="{FF2B5EF4-FFF2-40B4-BE49-F238E27FC236}">
-                <a16:creationId xmlns:a16="http://schemas.microsoft.com/office/drawing/2014/main" id="{ACF4CA0C-77E4-4A5A-8A69-9987311CA65B}"/>
-              </a:ext>
-            </a:extLst>
-          </p:cNvPr>
-          <p:cNvSpPr txBox="1"/>
-          <p:nvPr/>
-        </p:nvSpPr>
-        <p:spPr>
-          <a:xfrm>
-            <a:off x="2299252" y="1791205"/>
-            <a:ext cx="7898295" cy="646331"/>
-          </a:xfrm>
-          <a:prstGeom prst="rect">
-            <a:avLst/>
-          </a:prstGeom>
-          <a:noFill/>
-        </p:spPr>
-        <p:txBody>
-          <a:bodyPr wrap="square" rtlCol="0">
-            <a:spAutoFit/>
-          </a:bodyPr>
-          <a:lstStyle/>
-          <a:p>
-            <a:pPr marL="285750" indent="-285750">
-              <a:buFont typeface="Arial" panose="020B0604020202020204" pitchFamily="34" charset="0"/>
-              <a:buChar char="•"/>
-            </a:pPr>
-            <a:endParaRPr lang="en-US" dirty="0"/>
-          </a:p>
-          <a:p>
-            <a:pPr marL="285750" indent="-285750">
-              <a:buFont typeface="Arial" panose="020B0604020202020204" pitchFamily="34" charset="0"/>
-              <a:buChar char="•"/>
-            </a:pPr>
-            <a:endParaRPr lang="en-US" dirty="0"/>
-          </a:p>
-        </p:txBody>
-      </p:sp>
-      <p:sp>
-        <p:nvSpPr>
-          <p:cNvPr id="6" name="Rectangle 5">
-            <a:extLst>
-              <a:ext uri="{FF2B5EF4-FFF2-40B4-BE49-F238E27FC236}">
-                <a16:creationId xmlns:a16="http://schemas.microsoft.com/office/drawing/2014/main" id="{92CC0FFC-9FF3-48BF-905A-87822B7B6042}"/>
-              </a:ext>
-            </a:extLst>
-          </p:cNvPr>
-          <p:cNvSpPr/>
-          <p:nvPr/>
-        </p:nvSpPr>
-        <p:spPr>
-          <a:xfrm>
-            <a:off x="464236" y="998269"/>
-            <a:ext cx="11283816" cy="830997"/>
-          </a:xfrm>
-          <a:prstGeom prst="rect">
-            <a:avLst/>
-          </a:prstGeom>
-        </p:spPr>
-        <p:txBody>
-          <a:bodyPr wrap="square">
-            <a:spAutoFit/>
-          </a:bodyPr>
-          <a:lstStyle/>
-          <a:p>
-            <a:pPr lvl="0" algn="ctr"/>
-            <a:r>
-              <a:rPr lang="en-US" sz="2400" dirty="0"/>
-              <a:t>What are the trends from 2013-2017 for the overall entertainment category in total consumer expenditure?</a:t>
-            </a:r>
-          </a:p>
-        </p:txBody>
-      </p:sp>
       <p:pic>
         <p:nvPicPr>
           <p:cNvPr id="3" name="Picture 2">
             <a:extLst>
               <a:ext uri="{FF2B5EF4-FFF2-40B4-BE49-F238E27FC236}">
-                <a16:creationId xmlns:a16="http://schemas.microsoft.com/office/drawing/2014/main" id="{4167058B-748C-4C97-974C-5ED76C793A9A}"/>
+                <a16:creationId xmlns:a16="http://schemas.microsoft.com/office/drawing/2014/main" id="{21F3E6D6-A0A0-4381-9F73-7BDA923ED30F}"/>
               </a:ext>
             </a:extLst>
           </p:cNvPr>
@@ -7197,25 +7588,103 @@
               </a:ext>
             </a:extLst>
           </a:blip>
-          <a:srcRect r="14647"/>
+          <a:srcRect r="25655"/>
           <a:stretch/>
         </p:blipFill>
         <p:spPr>
           <a:xfrm>
-            <a:off x="2420809" y="2157562"/>
-            <a:ext cx="5898237" cy="4348500"/>
+            <a:off x="2299252" y="2114370"/>
+            <a:ext cx="5768571" cy="4320585"/>
           </a:xfrm>
           <a:prstGeom prst="rect">
             <a:avLst/>
           </a:prstGeom>
         </p:spPr>
       </p:pic>
+      <p:sp>
+        <p:nvSpPr>
+          <p:cNvPr id="5" name="TextBox 4">
+            <a:extLst>
+              <a:ext uri="{FF2B5EF4-FFF2-40B4-BE49-F238E27FC236}">
+                <a16:creationId xmlns:a16="http://schemas.microsoft.com/office/drawing/2014/main" id="{ACF4CA0C-77E4-4A5A-8A69-9987311CA65B}"/>
+              </a:ext>
+            </a:extLst>
+          </p:cNvPr>
+          <p:cNvSpPr txBox="1"/>
+          <p:nvPr/>
+        </p:nvSpPr>
+        <p:spPr>
+          <a:xfrm>
+            <a:off x="2299252" y="1791205"/>
+            <a:ext cx="7898295" cy="646331"/>
+          </a:xfrm>
+          <a:prstGeom prst="rect">
+            <a:avLst/>
+          </a:prstGeom>
+          <a:noFill/>
+        </p:spPr>
+        <p:txBody>
+          <a:bodyPr wrap="square" rtlCol="0">
+            <a:spAutoFit/>
+          </a:bodyPr>
+          <a:lstStyle/>
+          <a:p>
+            <a:pPr marL="285750" indent="-285750">
+              <a:buFont typeface="Arial" panose="020B0604020202020204" pitchFamily="34" charset="0"/>
+              <a:buChar char="•"/>
+            </a:pPr>
+            <a:endParaRPr lang="en-US" dirty="0"/>
+          </a:p>
+          <a:p>
+            <a:pPr marL="285750" indent="-285750">
+              <a:buFont typeface="Arial" panose="020B0604020202020204" pitchFamily="34" charset="0"/>
+              <a:buChar char="•"/>
+            </a:pPr>
+            <a:endParaRPr lang="en-US" dirty="0"/>
+          </a:p>
+        </p:txBody>
+      </p:sp>
+      <p:sp>
+        <p:nvSpPr>
+          <p:cNvPr id="6" name="Rectangle 5">
+            <a:extLst>
+              <a:ext uri="{FF2B5EF4-FFF2-40B4-BE49-F238E27FC236}">
+                <a16:creationId xmlns:a16="http://schemas.microsoft.com/office/drawing/2014/main" id="{92CC0FFC-9FF3-48BF-905A-87822B7B6042}"/>
+              </a:ext>
+            </a:extLst>
+          </p:cNvPr>
+          <p:cNvSpPr/>
+          <p:nvPr/>
+        </p:nvSpPr>
+        <p:spPr>
+          <a:xfrm>
+            <a:off x="443949" y="982009"/>
+            <a:ext cx="11326020" cy="830997"/>
+          </a:xfrm>
+          <a:prstGeom prst="rect">
+            <a:avLst/>
+          </a:prstGeom>
+        </p:spPr>
+        <p:txBody>
+          <a:bodyPr wrap="square">
+            <a:spAutoFit/>
+          </a:bodyPr>
+          <a:lstStyle/>
+          <a:p>
+            <a:pPr lvl="0" algn="ctr"/>
+            <a:r>
+              <a:rPr lang="en-US" sz="2400" dirty="0"/>
+              <a:t>What are the trends from 2013-2017 for the overall entertainment category in total consumer expenditure?</a:t>
+            </a:r>
+          </a:p>
+        </p:txBody>
+      </p:sp>
       <p:pic>
         <p:nvPicPr>
           <p:cNvPr id="7" name="Picture 6">
             <a:extLst>
               <a:ext uri="{FF2B5EF4-FFF2-40B4-BE49-F238E27FC236}">
-                <a16:creationId xmlns:a16="http://schemas.microsoft.com/office/drawing/2014/main" id="{49F55AE3-64CE-4938-9DA8-7BAB0B7A7D81}"/>
+                <a16:creationId xmlns:a16="http://schemas.microsoft.com/office/drawing/2014/main" id="{81E95F85-8614-4334-B985-1AEB60E197AC}"/>
               </a:ext>
             </a:extLst>
           </p:cNvPr>
@@ -7232,13 +7701,13 @@
               </a:ext>
             </a:extLst>
           </a:blip>
-          <a:srcRect l="82741" b="67692"/>
+          <a:srcRect l="74326" b="69573"/>
           <a:stretch/>
         </p:blipFill>
         <p:spPr>
           <a:xfrm>
-            <a:off x="9155078" y="2132263"/>
-            <a:ext cx="1669014" cy="1965945"/>
+            <a:off x="8625426" y="2209474"/>
+            <a:ext cx="2534643" cy="1672660"/>
           </a:xfrm>
           <a:prstGeom prst="rect">
             <a:avLst/>
@@ -7250,7 +7719,7 @@
           <p:cNvPr id="8" name="TextBox 7">
             <a:extLst>
               <a:ext uri="{FF2B5EF4-FFF2-40B4-BE49-F238E27FC236}">
-                <a16:creationId xmlns:a16="http://schemas.microsoft.com/office/drawing/2014/main" id="{F07CDC73-BABD-4E5C-B927-4C193DCDB27E}"/>
+                <a16:creationId xmlns:a16="http://schemas.microsoft.com/office/drawing/2014/main" id="{E5DF6A43-E5E1-4751-9EDB-7C861F97C777}"/>
               </a:ext>
             </a:extLst>
           </p:cNvPr>
@@ -7276,7 +7745,7 @@
             <a:pPr algn="ctr"/>
             <a:r>
               <a:rPr lang="en-US" sz="3600" b="1" dirty="0"/>
-              <a:t>RESULTS:  TRENDS BY REGION</a:t>
+              <a:t>RESULTS:  TRENDS BY RACE</a:t>
             </a:r>
           </a:p>
         </p:txBody>
@@ -7284,7 +7753,7 @@
     </p:spTree>
     <p:extLst>
       <p:ext uri="{BB962C8B-B14F-4D97-AF65-F5344CB8AC3E}">
-        <p14:creationId xmlns:p14="http://schemas.microsoft.com/office/powerpoint/2010/main" val="3516245655"/>
+        <p14:creationId xmlns:p14="http://schemas.microsoft.com/office/powerpoint/2010/main" val="1365939811"/>
       </p:ext>
     </p:extLst>
   </p:cSld>

</xml_diff>